<commit_message>
Menambahkan command, branch, dan fork
</commit_message>
<xml_diff>
--- a/introduce GIT.pptx
+++ b/introduce GIT.pptx
@@ -7,32 +7,38 @@
   <p:sldIdLst>
     <p:sldId id="256" r:id="rId3"/>
     <p:sldId id="257" r:id="rId4"/>
-    <p:sldId id="258" r:id="rId5"/>
-    <p:sldId id="283" r:id="rId6"/>
-    <p:sldId id="259" r:id="rId7"/>
-    <p:sldId id="260" r:id="rId8"/>
-    <p:sldId id="261" r:id="rId9"/>
-    <p:sldId id="262" r:id="rId10"/>
-    <p:sldId id="263" r:id="rId11"/>
-    <p:sldId id="264" r:id="rId12"/>
-    <p:sldId id="265" r:id="rId13"/>
-    <p:sldId id="266" r:id="rId14"/>
-    <p:sldId id="267" r:id="rId15"/>
-    <p:sldId id="268" r:id="rId16"/>
-    <p:sldId id="269" r:id="rId17"/>
-    <p:sldId id="270" r:id="rId18"/>
-    <p:sldId id="271" r:id="rId19"/>
-    <p:sldId id="272" r:id="rId20"/>
-    <p:sldId id="273" r:id="rId21"/>
-    <p:sldId id="274" r:id="rId22"/>
-    <p:sldId id="275" r:id="rId23"/>
-    <p:sldId id="276" r:id="rId24"/>
-    <p:sldId id="277" r:id="rId25"/>
-    <p:sldId id="278" r:id="rId26"/>
-    <p:sldId id="279" r:id="rId27"/>
-    <p:sldId id="280" r:id="rId28"/>
-    <p:sldId id="281" r:id="rId29"/>
-    <p:sldId id="282" r:id="rId30"/>
+    <p:sldId id="259" r:id="rId5"/>
+    <p:sldId id="260" r:id="rId6"/>
+    <p:sldId id="261" r:id="rId7"/>
+    <p:sldId id="262" r:id="rId8"/>
+    <p:sldId id="263" r:id="rId9"/>
+    <p:sldId id="264" r:id="rId10"/>
+    <p:sldId id="265" r:id="rId11"/>
+    <p:sldId id="266" r:id="rId12"/>
+    <p:sldId id="267" r:id="rId13"/>
+    <p:sldId id="268" r:id="rId14"/>
+    <p:sldId id="269" r:id="rId15"/>
+    <p:sldId id="270" r:id="rId16"/>
+    <p:sldId id="271" r:id="rId17"/>
+    <p:sldId id="272" r:id="rId18"/>
+    <p:sldId id="275" r:id="rId19"/>
+    <p:sldId id="308" r:id="rId20"/>
+    <p:sldId id="309" r:id="rId21"/>
+    <p:sldId id="310" r:id="rId22"/>
+    <p:sldId id="311" r:id="rId23"/>
+    <p:sldId id="312" r:id="rId24"/>
+    <p:sldId id="313" r:id="rId25"/>
+    <p:sldId id="314" r:id="rId26"/>
+    <p:sldId id="273" r:id="rId27"/>
+    <p:sldId id="274" r:id="rId28"/>
+    <p:sldId id="276" r:id="rId29"/>
+    <p:sldId id="277" r:id="rId30"/>
+    <p:sldId id="278" r:id="rId31"/>
+    <p:sldId id="279" r:id="rId32"/>
+    <p:sldId id="280" r:id="rId33"/>
+    <p:sldId id="281" r:id="rId34"/>
+    <p:sldId id="315" r:id="rId35"/>
+    <p:sldId id="316" r:id="rId36"/>
   </p:sldIdLst>
   <p:sldSz cx="12192000" cy="6858000"/>
   <p:notesSz cx="6858000" cy="9144000"/>
@@ -2960,8 +2966,8 @@
         </p:nvSpPr>
         <p:spPr>
           <a:xfrm>
-            <a:off x="1638935" y="859155"/>
-            <a:ext cx="9144000" cy="1160145"/>
+            <a:off x="4296410" y="2402205"/>
+            <a:ext cx="2492375" cy="1160145"/>
           </a:xfrm>
         </p:spPr>
         <p:txBody>
@@ -2969,10 +2975,10 @@
           <a:lstStyle/>
           <a:p>
             <a:r>
-              <a:rPr lang="en-US" dirty="0"/>
+              <a:rPr lang="en-US" sz="3600" dirty="0"/>
               <a:t>Introduce To</a:t>
             </a:r>
-            <a:endParaRPr lang="en-US" dirty="0"/>
+            <a:endParaRPr lang="en-US" sz="3600" dirty="0"/>
           </a:p>
         </p:txBody>
       </p:sp>
@@ -2992,14 +2998,112 @@
         </p:blipFill>
         <p:spPr>
           <a:xfrm>
-            <a:off x="3490595" y="2341245"/>
-            <a:ext cx="5210810" cy="2176145"/>
+            <a:off x="4190365" y="3562350"/>
+            <a:ext cx="3811270" cy="1591945"/>
           </a:xfrm>
           <a:prstGeom prst="rect">
             <a:avLst/>
           </a:prstGeom>
         </p:spPr>
       </p:pic>
+      <p:sp>
+        <p:nvSpPr>
+          <p:cNvPr id="3" name="Title 1"/>
+          <p:cNvSpPr>
+            <a:spLocks noGrp="1"/>
+          </p:cNvSpPr>
+          <p:nvPr/>
+        </p:nvSpPr>
+        <p:spPr>
+          <a:xfrm>
+            <a:off x="1638935" y="636270"/>
+            <a:ext cx="9144000" cy="1160145"/>
+          </a:xfrm>
+          <a:prstGeom prst="rect">
+            <a:avLst/>
+          </a:prstGeom>
+        </p:spPr>
+        <p:txBody>
+          <a:bodyPr vert="horz" lIns="91440" tIns="45720" rIns="91440" bIns="45720" rtlCol="0" anchor="b">
+            <a:normAutofit/>
+          </a:bodyPr>
+          <a:lstStyle>
+            <a:lvl1pPr algn="ctr" defTabSz="914400" rtl="0" eaLnBrk="1" latinLnBrk="0" hangingPunct="1">
+              <a:lnSpc>
+                <a:spcPct val="90000"/>
+              </a:lnSpc>
+              <a:spcBef>
+                <a:spcPct val="0"/>
+              </a:spcBef>
+              <a:buNone/>
+              <a:defRPr sz="6000" kern="1200">
+                <a:solidFill>
+                  <a:schemeClr val="tx1"/>
+                </a:solidFill>
+                <a:latin typeface="+mj-lt"/>
+                <a:ea typeface="+mj-ea"/>
+                <a:cs typeface="+mj-cs"/>
+              </a:defRPr>
+            </a:lvl1pPr>
+          </a:lstStyle>
+          <a:p>
+            <a:r>
+              <a:rPr lang="en-US" dirty="0"/>
+              <a:t>Fun Meeting InterActive</a:t>
+            </a:r>
+            <a:endParaRPr lang="en-US" dirty="0"/>
+          </a:p>
+        </p:txBody>
+      </p:sp>
+      <p:sp>
+        <p:nvSpPr>
+          <p:cNvPr id="5" name="Title 1"/>
+          <p:cNvSpPr>
+            <a:spLocks noGrp="1"/>
+          </p:cNvSpPr>
+          <p:nvPr/>
+        </p:nvSpPr>
+        <p:spPr>
+          <a:xfrm>
+            <a:off x="5156835" y="1640205"/>
+            <a:ext cx="4784090" cy="602615"/>
+          </a:xfrm>
+          <a:prstGeom prst="rect">
+            <a:avLst/>
+          </a:prstGeom>
+        </p:spPr>
+        <p:txBody>
+          <a:bodyPr vert="horz" lIns="91440" tIns="45720" rIns="91440" bIns="45720" rtlCol="0" anchor="b">
+            <a:normAutofit/>
+          </a:bodyPr>
+          <a:lstStyle>
+            <a:lvl1pPr algn="ctr" defTabSz="914400" rtl="0" eaLnBrk="1" latinLnBrk="0" hangingPunct="1">
+              <a:lnSpc>
+                <a:spcPct val="90000"/>
+              </a:lnSpc>
+              <a:spcBef>
+                <a:spcPct val="0"/>
+              </a:spcBef>
+              <a:buNone/>
+              <a:defRPr sz="6000" kern="1200">
+                <a:solidFill>
+                  <a:schemeClr val="tx1"/>
+                </a:solidFill>
+                <a:latin typeface="+mj-lt"/>
+                <a:ea typeface="+mj-ea"/>
+                <a:cs typeface="+mj-cs"/>
+              </a:defRPr>
+            </a:lvl1pPr>
+          </a:lstStyle>
+          <a:p>
+            <a:r>
+              <a:rPr lang="en-US" sz="3200" dirty="0"/>
+              <a:t>Friday, September 27 2019</a:t>
+            </a:r>
+            <a:endParaRPr lang="en-US" sz="3200" dirty="0"/>
+          </a:p>
+        </p:txBody>
+      </p:sp>
     </p:spTree>
     <p:custDataLst>
       <p:tags r:id="rId2"/>
@@ -3035,12 +3139,11 @@
         <p:txBody>
           <a:bodyPr/>
           <a:p>
-            <a:pPr algn="ctr"/>
-            <a:r>
-              <a:rPr lang="en-US" sz="6600"/>
-              <a:t>What is git?</a:t>
-            </a:r>
-            <a:endParaRPr lang="en-US" sz="6600"/>
+            <a:r>
+              <a:rPr lang="en-US"/>
+              <a:t>A brief history</a:t>
+            </a:r>
+            <a:endParaRPr lang="en-US"/>
           </a:p>
         </p:txBody>
       </p:sp>
@@ -3059,51 +3162,79 @@
           <a:bodyPr/>
           <a:p>
             <a:r>
-              <a:rPr lang="en-US"/>
-              <a:t>Open source project originally developed in 2005 by Linus Torvalds</a:t>
-            </a:r>
-            <a:endParaRPr lang="en-US"/>
-          </a:p>
-          <a:p>
-            <a:r>
-              <a:rPr lang="en-US"/>
-              <a:t>A command line utility</a:t>
-            </a:r>
-            <a:endParaRPr lang="en-US"/>
-          </a:p>
-          <a:p>
-            <a:r>
-              <a:rPr lang="en-US"/>
-              <a:t>You can imagine </a:t>
-            </a:r>
-            <a:r>
-              <a:rPr lang="en-US">
+              <a:rPr lang="en-US" sz="3600"/>
+              <a:t>In 2002, the Linux kernel project began using a DVCS called </a:t>
+            </a:r>
+            <a:r>
+              <a:rPr lang="en-US" sz="3600">
+                <a:solidFill>
+                  <a:srgbClr val="FF0000"/>
+                </a:solidFill>
+              </a:rPr>
+              <a:t>BitKeeper</a:t>
+            </a:r>
+            <a:endParaRPr lang="en-US" sz="3600"/>
+          </a:p>
+          <a:p>
+            <a:r>
+              <a:rPr lang="en-US" sz="3600"/>
+              <a:t>In 2005, the commercial company that developed BitKeeper </a:t>
+            </a:r>
+            <a:r>
+              <a:rPr lang="en-US" sz="3600">
+                <a:solidFill>
+                  <a:srgbClr val="FF0000"/>
+                </a:solidFill>
+              </a:rPr>
+              <a:t>broke down</a:t>
+            </a:r>
+            <a:r>
+              <a:rPr lang="en-US" sz="3600"/>
+              <a:t>, and the tool’s</a:t>
+            </a:r>
+            <a:r>
+              <a:rPr lang="en-US" sz="3600">
+                <a:solidFill>
+                  <a:srgbClr val="FF0000"/>
+                </a:solidFill>
+              </a:rPr>
+              <a:t> free-of-charge</a:t>
+            </a:r>
+            <a:r>
+              <a:rPr lang="en-US" sz="3600"/>
+              <a:t> status </a:t>
+            </a:r>
+            <a:r>
+              <a:rPr lang="en-US" sz="3600">
+                <a:solidFill>
+                  <a:srgbClr val="FF0000"/>
+                </a:solidFill>
+              </a:rPr>
+              <a:t>was revoked </a:t>
+            </a:r>
+            <a:endParaRPr lang="en-US" sz="3600"/>
+          </a:p>
+          <a:p>
+            <a:r>
+              <a:rPr lang="en-US" sz="3600"/>
+              <a:t>This prompted the Linux development community (and in particular Linus Torvalds, the creator of Linux) to develop their own tool - </a:t>
+            </a:r>
+            <a:r>
+              <a:rPr lang="en-US" sz="3600">
                 <a:solidFill>
                   <a:srgbClr val="C00000"/>
                 </a:solidFill>
               </a:rPr>
               <a:t>git</a:t>
             </a:r>
-            <a:r>
-              <a:rPr lang="en-US"/>
-              <a:t> as something that your file system and manipulates files</a:t>
-            </a:r>
-            <a:endParaRPr lang="en-US"/>
-          </a:p>
-          <a:p>
-            <a:r>
-              <a:rPr lang="en-US"/>
-              <a:t>A distributed version control system - </a:t>
-            </a:r>
-            <a:r>
-              <a:rPr lang="en-US">
-                <a:solidFill>
-                  <a:srgbClr val="C00000"/>
-                </a:solidFill>
-              </a:rPr>
-              <a:t>DCVS</a:t>
-            </a:r>
-            <a:endParaRPr lang="en-US">
+            <a:endParaRPr lang="en-US" sz="3600">
+              <a:solidFill>
+                <a:srgbClr val="C00000"/>
+              </a:solidFill>
+            </a:endParaRPr>
+          </a:p>
+          <a:p>
+            <a:endParaRPr lang="en-US" sz="3600">
               <a:solidFill>
                 <a:srgbClr val="C00000"/>
               </a:solidFill>
@@ -3131,7 +3262,7 @@
       <p:grpSpPr/>
       <p:sp>
         <p:nvSpPr>
-          <p:cNvPr id="2" name="Title 1"/>
+          <p:cNvPr id="6" name="Title 5"/>
           <p:cNvSpPr>
             <a:spLocks noGrp="1"/>
           </p:cNvSpPr>
@@ -3141,49 +3272,38 @@
         </p:nvSpPr>
         <p:spPr/>
         <p:txBody>
-          <a:bodyPr>
-            <a:normAutofit/>
-          </a:bodyPr>
-          <a:p>
-            <a:r>
-              <a:rPr lang="en-US">
-                <a:sym typeface="+mn-ea"/>
-              </a:rPr>
-              <a:t>What is “distributed version control system” ?</a:t>
-            </a:r>
-            <a:endParaRPr lang="en-US"/>
-          </a:p>
-        </p:txBody>
-      </p:sp>
-      <p:sp>
-        <p:nvSpPr>
-          <p:cNvPr id="3" name="Content Placeholder 2"/>
-          <p:cNvSpPr>
-            <a:spLocks noGrp="1"/>
-          </p:cNvSpPr>
+          <a:bodyPr/>
+          <a:p>
+            <a:endParaRPr lang="en-US"/>
+          </a:p>
+        </p:txBody>
+      </p:sp>
+      <p:pic>
+        <p:nvPicPr>
+          <p:cNvPr id="5" name="Content Placeholder 4"/>
+          <p:cNvPicPr>
+            <a:picLocks noChangeAspect="1"/>
+          </p:cNvPicPr>
           <p:nvPr>
             <p:ph idx="1"/>
           </p:nvPr>
-        </p:nvSpPr>
-        <p:spPr/>
-        <p:txBody>
-          <a:bodyPr/>
-          <a:p>
-            <a:r>
-              <a:rPr lang="en-US" sz="3600"/>
-              <a:t>Version control system is a system that records changes to a file or set of files over time so that you can recall specific versions later</a:t>
-            </a:r>
-            <a:endParaRPr lang="en-US" sz="3600"/>
-          </a:p>
-          <a:p>
-            <a:r>
-              <a:rPr lang="en-US" sz="3600"/>
-              <a:t>Distributed means that there is no main server and all of the full history of the project is available once you cloned the project</a:t>
-            </a:r>
-            <a:endParaRPr lang="en-US" sz="3600"/>
-          </a:p>
-        </p:txBody>
-      </p:sp>
+        </p:nvPicPr>
+        <p:blipFill>
+          <a:blip r:embed="rId1"/>
+          <a:stretch>
+            <a:fillRect/>
+          </a:stretch>
+        </p:blipFill>
+        <p:spPr>
+          <a:xfrm>
+            <a:off x="2040255" y="151130"/>
+            <a:ext cx="8454390" cy="6322060"/>
+          </a:xfrm>
+          <a:prstGeom prst="rect">
+            <a:avLst/>
+          </a:prstGeom>
+        </p:spPr>
+      </p:pic>
     </p:spTree>
   </p:cSld>
   <p:clrMapOvr>
@@ -3216,69 +3336,77 @@
         <p:txBody>
           <a:bodyPr/>
           <a:p>
+            <a:pPr algn="ctr"/>
+            <a:r>
+              <a:rPr lang="en-US" sz="6600"/>
+              <a:t>git</a:t>
+            </a:r>
+            <a:endParaRPr lang="en-US" sz="6600"/>
+          </a:p>
+        </p:txBody>
+      </p:sp>
+      <p:sp>
+        <p:nvSpPr>
+          <p:cNvPr id="3" name="Content Placeholder 2"/>
+          <p:cNvSpPr>
+            <a:spLocks noGrp="1"/>
+          </p:cNvSpPr>
+          <p:nvPr>
+            <p:ph sz="half" idx="1"/>
+          </p:nvPr>
+        </p:nvSpPr>
+        <p:spPr/>
+        <p:txBody>
+          <a:bodyPr/>
+          <a:p>
             <a:r>
               <a:rPr lang="en-US"/>
-              <a:t>A brief history</a:t>
-            </a:r>
-            <a:endParaRPr lang="en-US"/>
-          </a:p>
-        </p:txBody>
-      </p:sp>
-      <p:sp>
-        <p:nvSpPr>
-          <p:cNvPr id="3" name="Content Placeholder 2"/>
-          <p:cNvSpPr>
-            <a:spLocks noGrp="1"/>
-          </p:cNvSpPr>
-          <p:nvPr>
-            <p:ph idx="1"/>
-          </p:nvPr>
-        </p:nvSpPr>
-        <p:spPr/>
-        <p:txBody>
-          <a:bodyPr/>
-          <a:p>
-            <a:r>
-              <a:rPr lang="en-US" sz="3600"/>
-              <a:t>In 2002, the Linux kernel project began using a DVCS called BitKeeper</a:t>
-            </a:r>
-            <a:endParaRPr lang="en-US" sz="3600"/>
-          </a:p>
-          <a:p>
-            <a:r>
-              <a:rPr lang="en-US" sz="3600"/>
-              <a:t>In 2005, the commercial company that developed BitKeeper broke down, and the tool’s free-of-charge status was revoked</a:t>
-            </a:r>
-            <a:endParaRPr lang="en-US" sz="3600"/>
-          </a:p>
-          <a:p>
-            <a:r>
-              <a:rPr lang="en-US" sz="3600"/>
-              <a:t>This prompted the Linux development community (and in particular Linus Torvalds, the creator of Linux) to develop their own tool - </a:t>
-            </a:r>
-            <a:r>
-              <a:rPr lang="en-US" sz="3600">
-                <a:solidFill>
-                  <a:srgbClr val="C00000"/>
-                </a:solidFill>
-              </a:rPr>
-              <a:t>git</a:t>
-            </a:r>
-            <a:endParaRPr lang="en-US" sz="3600">
-              <a:solidFill>
-                <a:srgbClr val="C00000"/>
-              </a:solidFill>
-            </a:endParaRPr>
-          </a:p>
-          <a:p>
-            <a:endParaRPr lang="en-US" sz="3600">
-              <a:solidFill>
-                <a:srgbClr val="C00000"/>
-              </a:solidFill>
-            </a:endParaRPr>
-          </a:p>
-        </p:txBody>
-      </p:sp>
+              <a:t>You can imagine git as something that sits on top of your file system and manipulates files</a:t>
+            </a:r>
+            <a:endParaRPr lang="en-US"/>
+          </a:p>
+          <a:p>
+            <a:r>
+              <a:rPr lang="en-US"/>
+              <a:t>This “something” is a tree structure where each commit creates a new node in that tree</a:t>
+            </a:r>
+            <a:endParaRPr lang="en-US"/>
+          </a:p>
+          <a:p>
+            <a:r>
+              <a:rPr lang="en-US"/>
+              <a:t>Nearly all git commands actually serve to navigate on this tree and to manipulate it accordingly</a:t>
+            </a:r>
+            <a:endParaRPr lang="en-US"/>
+          </a:p>
+        </p:txBody>
+      </p:sp>
+      <p:pic>
+        <p:nvPicPr>
+          <p:cNvPr id="6" name="Content Placeholder 5"/>
+          <p:cNvPicPr>
+            <a:picLocks noChangeAspect="1"/>
+          </p:cNvPicPr>
+          <p:nvPr>
+            <p:ph sz="half" idx="2"/>
+          </p:nvPr>
+        </p:nvPicPr>
+        <p:blipFill>
+          <a:blip r:embed="rId1"/>
+          <a:stretch>
+            <a:fillRect/>
+          </a:stretch>
+        </p:blipFill>
+        <p:spPr>
+          <a:xfrm>
+            <a:off x="7611745" y="1691005"/>
+            <a:ext cx="3545205" cy="4486275"/>
+          </a:xfrm>
+          <a:prstGeom prst="rect">
+            <a:avLst/>
+          </a:prstGeom>
+        </p:spPr>
+      </p:pic>
     </p:spTree>
   </p:cSld>
   <p:clrMapOvr>
@@ -3311,32 +3439,41 @@
         <p:txBody>
           <a:bodyPr/>
           <a:p>
-            <a:r>
-              <a:rPr lang="en-US"/>
-              <a:t>Demo</a:t>
-            </a:r>
-            <a:endParaRPr lang="en-US"/>
-          </a:p>
-        </p:txBody>
-      </p:sp>
-      <p:sp>
-        <p:nvSpPr>
-          <p:cNvPr id="3" name="Content Placeholder 2"/>
-          <p:cNvSpPr>
-            <a:spLocks noGrp="1"/>
-          </p:cNvSpPr>
+            <a:pPr algn="ctr"/>
+            <a:r>
+              <a:rPr lang="en-US" sz="6600"/>
+              <a:t>git repository</a:t>
+            </a:r>
+            <a:endParaRPr lang="en-US" sz="6600"/>
+          </a:p>
+        </p:txBody>
+      </p:sp>
+      <p:pic>
+        <p:nvPicPr>
+          <p:cNvPr id="5" name="Content Placeholder 4"/>
+          <p:cNvPicPr>
+            <a:picLocks noChangeAspect="1"/>
+          </p:cNvPicPr>
           <p:nvPr>
             <p:ph idx="1"/>
           </p:nvPr>
-        </p:nvSpPr>
-        <p:spPr/>
-        <p:txBody>
-          <a:bodyPr/>
-          <a:p>
-            <a:endParaRPr lang="en-US"/>
-          </a:p>
-        </p:txBody>
-      </p:sp>
+        </p:nvPicPr>
+        <p:blipFill>
+          <a:blip r:embed="rId1"/>
+          <a:stretch>
+            <a:fillRect/>
+          </a:stretch>
+        </p:blipFill>
+        <p:spPr>
+          <a:xfrm>
+            <a:off x="3849370" y="1691005"/>
+            <a:ext cx="4493260" cy="4702175"/>
+          </a:xfrm>
+          <a:prstGeom prst="rect">
+            <a:avLst/>
+          </a:prstGeom>
+        </p:spPr>
+      </p:pic>
     </p:spTree>
   </p:cSld>
   <p:clrMapOvr>
@@ -3371,10 +3508,10 @@
           <a:p>
             <a:pPr algn="ctr"/>
             <a:r>
-              <a:rPr lang="en-US" sz="6600"/>
-              <a:t>git</a:t>
-            </a:r>
-            <a:endParaRPr lang="en-US" sz="6600"/>
+              <a:rPr lang="en-US" sz="6000"/>
+              <a:t>git repository</a:t>
+            </a:r>
+            <a:endParaRPr lang="en-US" sz="6000"/>
           </a:p>
         </p:txBody>
       </p:sp>
@@ -3394,21 +3531,25 @@
           <a:p>
             <a:r>
               <a:rPr lang="en-US"/>
-              <a:t>You can imagine git as something that sits on top of your file system and manipulates files</a:t>
+              <a:t>The purpose of git is to manage a project, or a set of files, as they change over time. Git stores this information in a data structure called a repository</a:t>
             </a:r>
             <a:endParaRPr lang="en-US"/>
           </a:p>
           <a:p>
             <a:r>
               <a:rPr lang="en-US"/>
-              <a:t>This “something” is a tree structure where each commit creates a new node in that tree</a:t>
-            </a:r>
-            <a:endParaRPr lang="en-US"/>
-          </a:p>
-          <a:p>
+              <a:t>A git repository contains, mainly:</a:t>
+            </a:r>
+            <a:endParaRPr lang="en-US"/>
+          </a:p>
+          <a:p>
+            <a:pPr marL="484505" indent="-227965">
+              <a:buFont typeface="Wingdings" panose="05000000000000000000" charset="0"/>
+              <a:buChar char="Ø"/>
+            </a:pPr>
             <a:r>
               <a:rPr lang="en-US"/>
-              <a:t>Nearly all git commands actually serve to navigate on this tree andto manipulate it accordingly</a:t>
+              <a:t>A set of commits</a:t>
             </a:r>
             <a:endParaRPr lang="en-US"/>
           </a:p>
@@ -3416,7 +3557,7 @@
       </p:sp>
       <p:pic>
         <p:nvPicPr>
-          <p:cNvPr id="6" name="Content Placeholder 5"/>
+          <p:cNvPr id="5" name="Content Placeholder 4"/>
           <p:cNvPicPr>
             <a:picLocks noChangeAspect="1"/>
           </p:cNvPicPr>
@@ -3432,8 +3573,8 @@
         </p:blipFill>
         <p:spPr>
           <a:xfrm>
-            <a:off x="7611745" y="1691005"/>
-            <a:ext cx="3545205" cy="4486275"/>
+            <a:off x="7510145" y="1825625"/>
+            <a:ext cx="3519170" cy="3683000"/>
           </a:xfrm>
           <a:prstGeom prst="rect">
             <a:avLst/>
@@ -3474,39 +3615,73 @@
           <a:p>
             <a:pPr algn="ctr"/>
             <a:r>
-              <a:rPr lang="en-US" sz="6600"/>
-              <a:t>git repository</a:t>
-            </a:r>
-            <a:endParaRPr lang="en-US" sz="6600"/>
-          </a:p>
-        </p:txBody>
-      </p:sp>
-      <p:pic>
-        <p:nvPicPr>
-          <p:cNvPr id="5" name="Content Placeholder 4"/>
-          <p:cNvPicPr>
-            <a:picLocks noChangeAspect="1"/>
-          </p:cNvPicPr>
-          <p:nvPr>
-            <p:ph idx="1"/>
-          </p:nvPr>
-        </p:nvPicPr>
-        <p:blipFill>
-          <a:blip r:embed="rId1"/>
-          <a:stretch>
-            <a:fillRect/>
-          </a:stretch>
-        </p:blipFill>
-        <p:spPr>
-          <a:xfrm>
-            <a:off x="3849370" y="1691005"/>
-            <a:ext cx="4493260" cy="4702175"/>
-          </a:xfrm>
-          <a:prstGeom prst="rect">
-            <a:avLst/>
-          </a:prstGeom>
-        </p:spPr>
-      </p:pic>
+              <a:rPr lang="en-US"/>
+              <a:t>Commit</a:t>
+            </a:r>
+            <a:endParaRPr lang="en-US"/>
+          </a:p>
+        </p:txBody>
+      </p:sp>
+      <p:sp>
+        <p:nvSpPr>
+          <p:cNvPr id="3" name="Content Placeholder 2"/>
+          <p:cNvSpPr>
+            <a:spLocks noGrp="1"/>
+          </p:cNvSpPr>
+          <p:nvPr>
+            <p:ph sz="half" idx="1"/>
+          </p:nvPr>
+        </p:nvSpPr>
+        <p:spPr>
+          <a:xfrm>
+            <a:off x="838200" y="1825625"/>
+            <a:ext cx="10649585" cy="4351655"/>
+          </a:xfrm>
+        </p:spPr>
+        <p:txBody>
+          <a:bodyPr/>
+          <a:p>
+            <a:r>
+              <a:rPr lang="en-US" sz="3600"/>
+              <a:t>A commit object mainly contains three things:</a:t>
+            </a:r>
+            <a:endParaRPr lang="en-US" sz="3600"/>
+          </a:p>
+          <a:p>
+            <a:pPr marL="834390" indent="-418465">
+              <a:buFont typeface="Wingdings" panose="05000000000000000000" charset="0"/>
+              <a:buChar char="Ø"/>
+            </a:pPr>
+            <a:r>
+              <a:rPr lang="en-US" sz="3600"/>
+              <a:t>A set of changes the commit introduces</a:t>
+            </a:r>
+            <a:endParaRPr lang="en-US" sz="3600"/>
+          </a:p>
+          <a:p>
+            <a:pPr marL="834390" indent="-418465">
+              <a:buFont typeface="Wingdings" panose="05000000000000000000" charset="0"/>
+              <a:buChar char="Ø"/>
+            </a:pPr>
+            <a:r>
+              <a:rPr lang="en-US" sz="3600"/>
+              <a:t>Commit message describing the changes</a:t>
+            </a:r>
+            <a:endParaRPr lang="en-US" sz="3600"/>
+          </a:p>
+          <a:p>
+            <a:pPr marL="834390" indent="-418465">
+              <a:buFont typeface="Wingdings" panose="05000000000000000000" charset="0"/>
+              <a:buChar char="Ø"/>
+            </a:pPr>
+            <a:r>
+              <a:rPr lang="en-US" sz="3600"/>
+              <a:t>A hash, a 40-character string that uniquely identifies</a:t>
+            </a:r>
+            <a:endParaRPr lang="en-US" sz="3600"/>
+          </a:p>
+        </p:txBody>
+      </p:sp>
     </p:spTree>
   </p:cSld>
   <p:clrMapOvr>
@@ -3541,48 +3716,8 @@
           <a:p>
             <a:pPr algn="ctr"/>
             <a:r>
-              <a:rPr lang="en-US" sz="6000"/>
-              <a:t>git repository</a:t>
-            </a:r>
-            <a:endParaRPr lang="en-US" sz="6000"/>
-          </a:p>
-        </p:txBody>
-      </p:sp>
-      <p:sp>
-        <p:nvSpPr>
-          <p:cNvPr id="3" name="Content Placeholder 2"/>
-          <p:cNvSpPr>
-            <a:spLocks noGrp="1"/>
-          </p:cNvSpPr>
-          <p:nvPr>
-            <p:ph sz="half" idx="1"/>
-          </p:nvPr>
-        </p:nvSpPr>
-        <p:spPr/>
-        <p:txBody>
-          <a:bodyPr/>
-          <a:p>
-            <a:r>
               <a:rPr lang="en-US"/>
-              <a:t>The purpose of git is to manage a project, or a set of files, as they change over time. Git stores this information in a data structure called a repository</a:t>
-            </a:r>
-            <a:endParaRPr lang="en-US"/>
-          </a:p>
-          <a:p>
-            <a:r>
-              <a:rPr lang="en-US"/>
-              <a:t>A git repository contains, mainly:</a:t>
-            </a:r>
-            <a:endParaRPr lang="en-US"/>
-          </a:p>
-          <a:p>
-            <a:pPr marL="484505" indent="-227965">
-              <a:buFont typeface="Wingdings" panose="05000000000000000000" charset="0"/>
-              <a:buChar char="Ø"/>
-            </a:pPr>
-            <a:r>
-              <a:rPr lang="en-US"/>
-              <a:t>A set of commits</a:t>
+              <a:t>Commit</a:t>
             </a:r>
             <a:endParaRPr lang="en-US"/>
           </a:p>
@@ -3595,7 +3730,7 @@
             <a:picLocks noChangeAspect="1"/>
           </p:cNvPicPr>
           <p:nvPr>
-            <p:ph sz="half" idx="2"/>
+            <p:ph sz="half" idx="1"/>
           </p:nvPr>
         </p:nvPicPr>
         <p:blipFill>
@@ -3606,8 +3741,8 @@
         </p:blipFill>
         <p:spPr>
           <a:xfrm>
-            <a:off x="7510145" y="1825625"/>
-            <a:ext cx="3519170" cy="3683000"/>
+            <a:off x="1341755" y="1548130"/>
+            <a:ext cx="9507855" cy="4718050"/>
           </a:xfrm>
           <a:prstGeom prst="rect">
             <a:avLst/>
@@ -3648,84 +3783,61 @@
           <a:p>
             <a:pPr algn="ctr"/>
             <a:r>
+              <a:rPr lang="en-US" sz="4800"/>
+              <a:t>git workflow</a:t>
+            </a:r>
+            <a:endParaRPr lang="en-US" sz="4800"/>
+          </a:p>
+        </p:txBody>
+      </p:sp>
+      <p:sp>
+        <p:nvSpPr>
+          <p:cNvPr id="4" name="Content Placeholder 3"/>
+          <p:cNvSpPr>
+            <a:spLocks noGrp="1"/>
+          </p:cNvSpPr>
+          <p:nvPr>
+            <p:ph sz="half" idx="1"/>
+          </p:nvPr>
+        </p:nvSpPr>
+        <p:spPr/>
+        <p:txBody>
+          <a:bodyPr/>
+          <a:p>
+            <a:r>
               <a:rPr lang="en-US"/>
-              <a:t>Commit</a:t>
-            </a:r>
-            <a:endParaRPr lang="en-US"/>
-          </a:p>
-        </p:txBody>
-      </p:sp>
-      <p:sp>
-        <p:nvSpPr>
-          <p:cNvPr id="3" name="Content Placeholder 2"/>
-          <p:cNvSpPr>
-            <a:spLocks noGrp="1"/>
-          </p:cNvSpPr>
-          <p:nvPr>
-            <p:ph sz="half" idx="1"/>
-          </p:nvPr>
-        </p:nvSpPr>
-        <p:spPr>
-          <a:xfrm>
-            <a:off x="838200" y="1825625"/>
-            <a:ext cx="10649585" cy="4351655"/>
-          </a:xfrm>
-        </p:spPr>
-        <p:txBody>
-          <a:bodyPr/>
-          <a:p>
-            <a:r>
-              <a:rPr lang="en-US" sz="3600"/>
-              <a:t>A commit object mainly contains three things:</a:t>
-            </a:r>
-            <a:endParaRPr lang="en-US" sz="3600"/>
-          </a:p>
-          <a:p>
-            <a:pPr marL="834390" indent="-418465">
-              <a:buFont typeface="Wingdings" panose="05000000000000000000" charset="0"/>
-              <a:buChar char="Ø"/>
-            </a:pPr>
-            <a:r>
-              <a:rPr lang="en-US" sz="3600"/>
-              <a:t>A set of changes the commit introduces</a:t>
-            </a:r>
-            <a:endParaRPr lang="en-US" sz="3600"/>
-          </a:p>
-          <a:p>
-            <a:pPr marL="834390" indent="-418465">
-              <a:buFont typeface="Wingdings" panose="05000000000000000000" charset="0"/>
-              <a:buChar char="Ø"/>
-            </a:pPr>
-            <a:r>
-              <a:rPr lang="en-US" sz="3600"/>
-              <a:t>Commit message describing the changes</a:t>
-            </a:r>
-            <a:endParaRPr lang="en-US" sz="3600"/>
-          </a:p>
-          <a:p>
-            <a:pPr marL="834390" indent="-418465">
-              <a:buFont typeface="Wingdings" panose="05000000000000000000" charset="0"/>
-              <a:buChar char="Ø"/>
-            </a:pPr>
-            <a:r>
-              <a:rPr lang="en-US" sz="3600"/>
-              <a:t>A hash, a 40-character string that uniquely identifies</a:t>
-            </a:r>
-            <a:endParaRPr lang="en-US" sz="3600"/>
-          </a:p>
-          <a:p>
-            <a:pPr marL="834390" indent="-418465">
-              <a:buFont typeface="Wingdings" panose="05000000000000000000" charset="0"/>
-              <a:buChar char="Ø"/>
-            </a:pPr>
-            <a:r>
-              <a:rPr lang="en-US" sz="3600"/>
-              <a:t>the commit object</a:t>
-            </a:r>
-            <a:endParaRPr lang="en-US" sz="3600"/>
-          </a:p>
-        </p:txBody>
-      </p:sp>
+              <a:t>How commits are created?</a:t>
+            </a:r>
+            <a:endParaRPr lang="en-US"/>
+          </a:p>
+        </p:txBody>
+      </p:sp>
+      <p:pic>
+        <p:nvPicPr>
+          <p:cNvPr id="5" name="Content Placeholder 4"/>
+          <p:cNvPicPr>
+            <a:picLocks noChangeAspect="1"/>
+          </p:cNvPicPr>
+          <p:nvPr>
+            <p:ph sz="half" idx="2"/>
+          </p:nvPr>
+        </p:nvPicPr>
+        <p:blipFill>
+          <a:blip r:embed="rId1"/>
+          <a:stretch>
+            <a:fillRect/>
+          </a:stretch>
+        </p:blipFill>
+        <p:spPr>
+          <a:xfrm>
+            <a:off x="3088640" y="2665730"/>
+            <a:ext cx="6612255" cy="3867785"/>
+          </a:xfrm>
+          <a:prstGeom prst="rect">
+            <a:avLst/>
+          </a:prstGeom>
+        </p:spPr>
+      </p:pic>
     </p:spTree>
   </p:cSld>
   <p:clrMapOvr>
@@ -3758,41 +3870,90 @@
         <p:txBody>
           <a:bodyPr/>
           <a:p>
-            <a:pPr algn="ctr"/>
             <a:r>
               <a:rPr lang="en-US"/>
+              <a:t>Three Step Of Commit</a:t>
+            </a:r>
+            <a:endParaRPr lang="en-US"/>
+          </a:p>
+        </p:txBody>
+      </p:sp>
+      <p:sp>
+        <p:nvSpPr>
+          <p:cNvPr id="3" name="Content Placeholder 2"/>
+          <p:cNvSpPr>
+            <a:spLocks noGrp="1"/>
+          </p:cNvSpPr>
+          <p:nvPr>
+            <p:ph sz="half" idx="1"/>
+          </p:nvPr>
+        </p:nvSpPr>
+        <p:spPr>
+          <a:xfrm>
+            <a:off x="838200" y="1825625"/>
+            <a:ext cx="10369550" cy="4351655"/>
+          </a:xfrm>
+        </p:spPr>
+        <p:txBody>
+          <a:bodyPr/>
+          <a:p>
+            <a:r>
+              <a:rPr lang="en-US">
+                <a:solidFill>
+                  <a:srgbClr val="FF0000"/>
+                </a:solidFill>
+              </a:rPr>
+              <a:t>Introduce a change</a:t>
+            </a:r>
+            <a:r>
+              <a:rPr lang="en-US"/>
+              <a:t>: introduce a change to a file that is being tracked by git</a:t>
+            </a:r>
+            <a:endParaRPr lang="en-US"/>
+          </a:p>
+          <a:p>
+            <a:pPr marL="709295" indent="-466090">
+              <a:buFont typeface="Wingdings" panose="05000000000000000000" charset="0"/>
+              <a:buChar char="ü"/>
+            </a:pPr>
+            <a:r>
+              <a:rPr lang="en-US"/>
+              <a:t>Three type of change are : add new file, edited file, and deleted file</a:t>
+            </a:r>
+            <a:endParaRPr lang="en-US"/>
+          </a:p>
+          <a:p>
+            <a:r>
+              <a:rPr lang="en-US">
+                <a:solidFill>
+                  <a:srgbClr val="FF0000"/>
+                </a:solidFill>
+              </a:rPr>
+              <a:t>Add the actual change to staging area</a:t>
+            </a:r>
+            <a:r>
+              <a:rPr lang="en-US"/>
+              <a:t>: Add the change you actually want using “git add”</a:t>
+            </a:r>
+            <a:endParaRPr lang="en-US"/>
+          </a:p>
+          <a:p>
+            <a:r>
+              <a:rPr lang="en-US">
+                <a:solidFill>
+                  <a:srgbClr val="FF0000"/>
+                </a:solidFill>
+              </a:rPr>
               <a:t>Commit</a:t>
             </a:r>
-            <a:endParaRPr lang="en-US"/>
-          </a:p>
-        </p:txBody>
-      </p:sp>
-      <p:pic>
-        <p:nvPicPr>
-          <p:cNvPr id="5" name="Content Placeholder 4"/>
-          <p:cNvPicPr>
-            <a:picLocks noChangeAspect="1"/>
-          </p:cNvPicPr>
-          <p:nvPr>
-            <p:ph sz="half" idx="1"/>
-          </p:nvPr>
-        </p:nvPicPr>
-        <p:blipFill>
-          <a:blip r:embed="rId1"/>
-          <a:stretch>
-            <a:fillRect/>
-          </a:stretch>
-        </p:blipFill>
-        <p:spPr>
-          <a:xfrm>
-            <a:off x="1341755" y="1548130"/>
-            <a:ext cx="9507855" cy="4718050"/>
-          </a:xfrm>
-          <a:prstGeom prst="rect">
-            <a:avLst/>
-          </a:prstGeom>
-        </p:spPr>
-      </p:pic>
+            <a:r>
+              <a:rPr lang="en-US"/>
+              <a:t>: Commit the change that has been added using git commit</a:t>
+            </a:r>
+            <a:endParaRPr lang="en-US"/>
+          </a:p>
+        </p:txBody>
+      </p:sp>
     </p:spTree>
   </p:cSld>
   <p:clrMapOvr>
@@ -3828,12 +3989,101 @@
             <a:pPr algn="ctr"/>
             <a:r>
               <a:rPr lang="en-US"/>
-              <a:t>github</a:t>
-            </a:r>
-            <a:endParaRPr lang="en-US"/>
-          </a:p>
-        </p:txBody>
-      </p:sp>
+              <a:t>git init</a:t>
+            </a:r>
+            <a:endParaRPr lang="en-US"/>
+          </a:p>
+        </p:txBody>
+      </p:sp>
+      <p:sp>
+        <p:nvSpPr>
+          <p:cNvPr id="3" name="Content Placeholder 2"/>
+          <p:cNvSpPr>
+            <a:spLocks noGrp="1"/>
+          </p:cNvSpPr>
+          <p:nvPr>
+            <p:ph sz="half" idx="1"/>
+          </p:nvPr>
+        </p:nvSpPr>
+        <p:spPr/>
+        <p:txBody>
+          <a:bodyPr/>
+          <a:p>
+            <a:pPr>
+              <a:lnSpc>
+                <a:spcPct val="120000"/>
+              </a:lnSpc>
+            </a:pPr>
+            <a:r>
+              <a:rPr lang="en-US"/>
+              <a:t>Creates a new git repository</a:t>
+            </a:r>
+            <a:endParaRPr lang="en-US"/>
+          </a:p>
+          <a:p>
+            <a:pPr>
+              <a:lnSpc>
+                <a:spcPct val="120000"/>
+              </a:lnSpc>
+            </a:pPr>
+            <a:r>
+              <a:rPr lang="en-US"/>
+              <a:t>Can be used to convert an existing, unversioned project to a git repository or initialize a new empty repository</a:t>
+            </a:r>
+            <a:endParaRPr lang="en-US">
+              <a:solidFill>
+                <a:schemeClr val="tx1"/>
+              </a:solidFill>
+            </a:endParaRPr>
+          </a:p>
+          <a:p>
+            <a:pPr>
+              <a:lnSpc>
+                <a:spcPct val="120000"/>
+              </a:lnSpc>
+            </a:pPr>
+            <a:endParaRPr lang="en-US">
+              <a:solidFill>
+                <a:schemeClr val="tx1"/>
+              </a:solidFill>
+            </a:endParaRPr>
+          </a:p>
+          <a:p>
+            <a:pPr>
+              <a:lnSpc>
+                <a:spcPct val="120000"/>
+              </a:lnSpc>
+            </a:pPr>
+            <a:endParaRPr lang="en-US"/>
+          </a:p>
+        </p:txBody>
+      </p:sp>
+      <p:pic>
+        <p:nvPicPr>
+          <p:cNvPr id="5" name="Content Placeholder 4"/>
+          <p:cNvPicPr>
+            <a:picLocks noChangeAspect="1"/>
+          </p:cNvPicPr>
+          <p:nvPr>
+            <p:ph sz="half" idx="2"/>
+          </p:nvPr>
+        </p:nvPicPr>
+        <p:blipFill>
+          <a:blip r:embed="rId1"/>
+          <a:stretch>
+            <a:fillRect/>
+          </a:stretch>
+        </p:blipFill>
+        <p:spPr>
+          <a:xfrm>
+            <a:off x="6225540" y="1630680"/>
+            <a:ext cx="5462270" cy="5008245"/>
+          </a:xfrm>
+          <a:prstGeom prst="rect">
+            <a:avLst/>
+          </a:prstGeom>
+        </p:spPr>
+      </p:pic>
     </p:spTree>
   </p:cSld>
   <p:clrMapOvr>
@@ -3967,33 +4217,53 @@
         <p:txBody>
           <a:bodyPr/>
           <a:p>
-            <a:endParaRPr lang="en-US"/>
-          </a:p>
-        </p:txBody>
-      </p:sp>
-      <p:sp>
-        <p:nvSpPr>
-          <p:cNvPr id="4" name="Content Placeholder 3"/>
-          <p:cNvSpPr>
-            <a:spLocks noGrp="1"/>
-          </p:cNvSpPr>
-          <p:nvPr>
-            <p:ph sz="half" idx="2"/>
-          </p:nvPr>
-        </p:nvSpPr>
-        <p:spPr>
-          <a:xfrm>
-            <a:off x="838200" y="1825625"/>
-            <a:ext cx="10515600" cy="4351655"/>
-          </a:xfrm>
-        </p:spPr>
-        <p:txBody>
-          <a:bodyPr/>
-          <a:p>
-            <a:r>
-              <a:rPr lang="en-US"/>
-              <a:t>GitHub is a web-based Git repository hosting service</a:t>
-            </a:r>
+            <a:pPr algn="ctr"/>
+            <a:r>
+              <a:rPr lang="en-US">
+                <a:solidFill>
+                  <a:schemeClr val="tx1"/>
+                </a:solidFill>
+                <a:sym typeface="+mn-ea"/>
+              </a:rPr>
+              <a:t>git clone</a:t>
+            </a:r>
+            <a:endParaRPr lang="en-US">
+              <a:solidFill>
+                <a:schemeClr val="tx1"/>
+              </a:solidFill>
+              <a:sym typeface="+mn-ea"/>
+            </a:endParaRPr>
+          </a:p>
+        </p:txBody>
+      </p:sp>
+      <p:sp>
+        <p:nvSpPr>
+          <p:cNvPr id="3" name="Content Placeholder 2"/>
+          <p:cNvSpPr>
+            <a:spLocks noGrp="1"/>
+          </p:cNvSpPr>
+          <p:nvPr>
+            <p:ph sz="half" idx="1"/>
+          </p:nvPr>
+        </p:nvSpPr>
+        <p:spPr/>
+        <p:txBody>
+          <a:bodyPr/>
+          <a:p>
+            <a:r>
+              <a:rPr lang="en-US">
+                <a:sym typeface="+mn-ea"/>
+              </a:rPr>
+              <a:t>Copies an existing git repository, usually from cloud to client</a:t>
+            </a:r>
+            <a:endParaRPr lang="en-US">
+              <a:sym typeface="+mn-ea"/>
+            </a:endParaRPr>
+          </a:p>
+          <a:p>
+            <a:pPr marL="0" indent="0">
+              <a:buNone/>
+            </a:pPr>
             <a:endParaRPr lang="en-US"/>
           </a:p>
         </p:txBody>
@@ -4005,7 +4275,7 @@
             <a:picLocks noChangeAspect="1"/>
           </p:cNvPicPr>
           <p:nvPr>
-            <p:ph sz="half" idx="1"/>
+            <p:ph sz="half" idx="2"/>
           </p:nvPr>
         </p:nvPicPr>
         <p:blipFill>
@@ -4016,8 +4286,8 @@
         </p:blipFill>
         <p:spPr>
           <a:xfrm>
-            <a:off x="1903730" y="2573020"/>
-            <a:ext cx="8171180" cy="3951605"/>
+            <a:off x="3848735" y="2821305"/>
+            <a:ext cx="7195820" cy="3578860"/>
           </a:xfrm>
           <a:prstGeom prst="rect">
             <a:avLst/>
@@ -4058,16 +4328,26 @@
           <a:p>
             <a:pPr algn="ctr"/>
             <a:r>
-              <a:rPr lang="en-US" sz="4800"/>
-              <a:t>git workflow</a:t>
-            </a:r>
-            <a:endParaRPr lang="en-US" sz="4800"/>
-          </a:p>
-        </p:txBody>
-      </p:sp>
-      <p:sp>
-        <p:nvSpPr>
-          <p:cNvPr id="4" name="Content Placeholder 3"/>
+              <a:rPr lang="en-US">
+                <a:solidFill>
+                  <a:schemeClr val="tx1"/>
+                </a:solidFill>
+                <a:sym typeface="+mn-ea"/>
+              </a:rPr>
+              <a:t>git log</a:t>
+            </a:r>
+            <a:endParaRPr lang="en-US">
+              <a:solidFill>
+                <a:schemeClr val="tx1"/>
+              </a:solidFill>
+              <a:sym typeface="+mn-ea"/>
+            </a:endParaRPr>
+          </a:p>
+        </p:txBody>
+      </p:sp>
+      <p:sp>
+        <p:nvSpPr>
+          <p:cNvPr id="3" name="Content Placeholder 2"/>
           <p:cNvSpPr>
             <a:spLocks noGrp="1"/>
           </p:cNvSpPr>
@@ -4080,8 +4360,19 @@
           <a:bodyPr/>
           <a:p>
             <a:r>
-              <a:rPr lang="en-US"/>
-              <a:t>How commits are created?</a:t>
+              <a:rPr lang="en-US">
+                <a:solidFill>
+                  <a:srgbClr val="FF0000"/>
+                </a:solidFill>
+                <a:sym typeface="+mn-ea"/>
+              </a:rPr>
+              <a:t> </a:t>
+            </a:r>
+            <a:r>
+              <a:rPr lang="en-US">
+                <a:sym typeface="+mn-ea"/>
+              </a:rPr>
+              <a:t>Shows the commit logs</a:t>
             </a:r>
             <a:endParaRPr lang="en-US"/>
           </a:p>
@@ -4105,8 +4396,8 @@
         </p:blipFill>
         <p:spPr>
           <a:xfrm>
-            <a:off x="3088640" y="2665730"/>
-            <a:ext cx="6612255" cy="3867785"/>
+            <a:off x="7495540" y="699135"/>
+            <a:ext cx="4064635" cy="6003290"/>
           </a:xfrm>
           <a:prstGeom prst="rect">
             <a:avLst/>
@@ -4141,27 +4432,73 @@
             <p:ph type="title"/>
           </p:nvPr>
         </p:nvSpPr>
-        <p:spPr/>
-        <p:txBody>
-          <a:bodyPr/>
-          <a:p>
-            <a:pPr algn="ctr"/>
+        <p:spPr>
+          <a:xfrm>
+            <a:off x="838200" y="333375"/>
+            <a:ext cx="10515600" cy="1325563"/>
+          </a:xfrm>
+        </p:spPr>
+        <p:txBody>
+          <a:bodyPr/>
+          <a:p>
             <a:r>
               <a:rPr lang="en-US"/>
-              <a:t>github workflow</a:t>
-            </a:r>
-            <a:endParaRPr lang="en-US"/>
+              <a:t>Branch</a:t>
+            </a:r>
+            <a:endParaRPr lang="en-US"/>
+          </a:p>
+        </p:txBody>
+      </p:sp>
+      <p:sp>
+        <p:nvSpPr>
+          <p:cNvPr id="3" name="Content Placeholder 2"/>
+          <p:cNvSpPr>
+            <a:spLocks noGrp="1"/>
+          </p:cNvSpPr>
+          <p:nvPr>
+            <p:ph sz="half" idx="1"/>
+          </p:nvPr>
+        </p:nvSpPr>
+        <p:spPr/>
+        <p:txBody>
+          <a:bodyPr>
+            <a:noAutofit/>
+          </a:bodyPr>
+          <a:p>
+            <a:pPr marL="0" indent="0">
+              <a:lnSpc>
+                <a:spcPct val="110000"/>
+              </a:lnSpc>
+              <a:buNone/>
+            </a:pPr>
+            <a:r>
+              <a:rPr lang="en-US" sz="3200"/>
+              <a:t>A branch in </a:t>
+            </a:r>
+            <a:r>
+              <a:rPr lang="en-US" sz="3200">
+                <a:solidFill>
+                  <a:srgbClr val="C00000"/>
+                </a:solidFill>
+              </a:rPr>
+              <a:t>Git</a:t>
+            </a:r>
+            <a:r>
+              <a:rPr lang="en-US" sz="3200"/>
+              <a:t> is simply a lightweight movable pointer to one of these commits. The default branch name in Git is master . </a:t>
+            </a:r>
+            <a:endParaRPr lang="en-US" sz="3200"/>
           </a:p>
         </p:txBody>
       </p:sp>
       <p:pic>
         <p:nvPicPr>
-          <p:cNvPr id="5" name="Content Placeholder 4"/>
+          <p:cNvPr id="5" name="Content Placeholder 4" descr="1-RTgn1s0GY8r0rSPsAzf8NQ"/>
           <p:cNvPicPr>
             <a:picLocks noChangeAspect="1"/>
           </p:cNvPicPr>
           <p:nvPr>
-            <p:ph sz="half" idx="1"/>
+            <p:ph sz="half" idx="2"/>
           </p:nvPr>
         </p:nvPicPr>
         <p:blipFill>
@@ -4172,8 +4509,8 @@
         </p:blipFill>
         <p:spPr>
           <a:xfrm>
-            <a:off x="838200" y="1433830"/>
-            <a:ext cx="10677525" cy="4857750"/>
+            <a:off x="5424805" y="2172335"/>
+            <a:ext cx="6995160" cy="3658870"/>
           </a:xfrm>
           <a:prstGeom prst="rect">
             <a:avLst/>
@@ -4210,24 +4547,50 @@
         </p:nvSpPr>
         <p:spPr/>
         <p:txBody>
-          <a:bodyPr>
-            <a:normAutofit/>
+          <a:bodyPr/>
+          <a:p>
+            <a:pPr algn="ctr"/>
+            <a:r>
+              <a:rPr lang="en-US"/>
+              <a:t>Git Fork</a:t>
+            </a:r>
+            <a:endParaRPr lang="en-US"/>
+          </a:p>
+        </p:txBody>
+      </p:sp>
+      <p:sp>
+        <p:nvSpPr>
+          <p:cNvPr id="6" name="Text Box 5"/>
+          <p:cNvSpPr txBox="1"/>
+          <p:nvPr/>
+        </p:nvSpPr>
+        <p:spPr>
+          <a:xfrm>
+            <a:off x="588645" y="1868170"/>
+            <a:ext cx="5001895" cy="2861310"/>
+          </a:xfrm>
+          <a:prstGeom prst="rect">
+            <a:avLst/>
+          </a:prstGeom>
+          <a:noFill/>
+        </p:spPr>
+        <p:txBody>
+          <a:bodyPr wrap="square" rtlCol="0">
+            <a:spAutoFit/>
           </a:bodyPr>
           <a:p>
-            <a:pPr algn="ctr"/>
-            <a:r>
-              <a:rPr lang="en-US">
-                <a:sym typeface="+mn-ea"/>
-              </a:rPr>
-              <a:t>github workflow</a:t>
-            </a:r>
-            <a:endParaRPr lang="en-US"/>
+            <a:pPr algn="l"/>
+            <a:r>
+              <a:rPr lang="en-US" sz="3600"/>
+              <a:t>Fork means copying a project, changing its name, and creating a project and community with copies.</a:t>
+            </a:r>
+            <a:endParaRPr lang="en-US" sz="3600"/>
           </a:p>
         </p:txBody>
       </p:sp>
       <p:pic>
         <p:nvPicPr>
-          <p:cNvPr id="5" name="Content Placeholder 4"/>
+          <p:cNvPr id="8" name="Content Placeholder 7" descr="forkclone1_preview"/>
           <p:cNvPicPr>
             <a:picLocks noChangeAspect="1"/>
           </p:cNvPicPr>
@@ -4237,15 +4600,14 @@
         </p:nvPicPr>
         <p:blipFill>
           <a:blip r:embed="rId1"/>
-          <a:srcRect b="3710"/>
           <a:stretch>
             <a:fillRect/>
           </a:stretch>
         </p:blipFill>
         <p:spPr>
           <a:xfrm>
-            <a:off x="1619250" y="1821180"/>
-            <a:ext cx="9734550" cy="4136390"/>
+            <a:off x="5279390" y="1627505"/>
+            <a:ext cx="6614160" cy="3593465"/>
           </a:xfrm>
           <a:prstGeom prst="rect">
             <a:avLst/>
@@ -4272,7 +4634,7 @@
       <p:grpSpPr/>
       <p:sp>
         <p:nvSpPr>
-          <p:cNvPr id="5" name="Title 4"/>
+          <p:cNvPr id="2" name="Title 1"/>
           <p:cNvSpPr>
             <a:spLocks noGrp="1"/>
           </p:cNvSpPr>
@@ -4282,16 +4644,41 @@
         </p:nvSpPr>
         <p:spPr/>
         <p:txBody>
+          <a:bodyPr/>
+          <a:p>
+            <a:pPr algn="ctr"/>
+            <a:r>
+              <a:rPr lang="en-US"/>
+              <a:t>git fork</a:t>
+            </a:r>
+            <a:endParaRPr lang="en-US"/>
+          </a:p>
+        </p:txBody>
+      </p:sp>
+      <p:sp>
+        <p:nvSpPr>
+          <p:cNvPr id="3" name="Content Placeholder 2"/>
+          <p:cNvSpPr>
+            <a:spLocks noGrp="1"/>
+          </p:cNvSpPr>
+          <p:nvPr>
+            <p:ph sz="half" idx="1"/>
+          </p:nvPr>
+        </p:nvSpPr>
+        <p:spPr/>
+        <p:txBody>
           <a:bodyPr>
-            <a:normAutofit/>
+            <a:noAutofit/>
           </a:bodyPr>
           <a:p>
-            <a:pPr algn="ctr"/>
-            <a:r>
-              <a:rPr lang="en-US">
-                <a:sym typeface="+mn-ea"/>
-              </a:rPr>
-              <a:t>github workflow</a:t>
+            <a:pPr>
+              <a:lnSpc>
+                <a:spcPct val="120000"/>
+              </a:lnSpc>
+            </a:pPr>
+            <a:r>
+              <a:rPr lang="en-US"/>
+              <a:t>There have been many forks that have taken place in the history of free and open source software. Some of the biggest ones are forking MariaDB from MySQL, NextCloud from OwnCloud, and Jenkins from Hudson.</a:t>
             </a:r>
             <a:endParaRPr lang="en-US"/>
           </a:p>
@@ -4304,7 +4691,7 @@
             <a:picLocks noChangeAspect="1"/>
           </p:cNvPicPr>
           <p:nvPr>
-            <p:ph idx="1"/>
+            <p:ph sz="half" idx="2"/>
           </p:nvPr>
         </p:nvPicPr>
         <p:blipFill>
@@ -4315,8 +4702,80 @@
         </p:blipFill>
         <p:spPr>
           <a:xfrm>
-            <a:off x="1390015" y="1896110"/>
-            <a:ext cx="9410700" cy="4210050"/>
+            <a:off x="6763385" y="2382520"/>
+            <a:ext cx="1405890" cy="723265"/>
+          </a:xfrm>
+          <a:prstGeom prst="rect">
+            <a:avLst/>
+          </a:prstGeom>
+        </p:spPr>
+      </p:pic>
+      <p:pic>
+        <p:nvPicPr>
+          <p:cNvPr id="5" name="Picture 4"/>
+          <p:cNvPicPr>
+            <a:picLocks noChangeAspect="1"/>
+          </p:cNvPicPr>
+          <p:nvPr/>
+        </p:nvPicPr>
+        <p:blipFill>
+          <a:blip r:embed="rId2"/>
+          <a:stretch>
+            <a:fillRect/>
+          </a:stretch>
+        </p:blipFill>
+        <p:spPr>
+          <a:xfrm>
+            <a:off x="9268460" y="2382520"/>
+            <a:ext cx="1414780" cy="727710"/>
+          </a:xfrm>
+          <a:prstGeom prst="rect">
+            <a:avLst/>
+          </a:prstGeom>
+        </p:spPr>
+      </p:pic>
+      <p:pic>
+        <p:nvPicPr>
+          <p:cNvPr id="6" name="Picture 5" descr="1200px-OwnCloud_logo_and_wordmark.svg"/>
+          <p:cNvPicPr>
+            <a:picLocks noChangeAspect="1"/>
+          </p:cNvPicPr>
+          <p:nvPr/>
+        </p:nvPicPr>
+        <p:blipFill>
+          <a:blip r:embed="rId3"/>
+          <a:stretch>
+            <a:fillRect/>
+          </a:stretch>
+        </p:blipFill>
+        <p:spPr>
+          <a:xfrm>
+            <a:off x="6479540" y="3712210"/>
+            <a:ext cx="1973580" cy="975360"/>
+          </a:xfrm>
+          <a:prstGeom prst="rect">
+            <a:avLst/>
+          </a:prstGeom>
+        </p:spPr>
+      </p:pic>
+      <p:pic>
+        <p:nvPicPr>
+          <p:cNvPr id="7" name="Picture 6"/>
+          <p:cNvPicPr>
+            <a:picLocks noChangeAspect="1"/>
+          </p:cNvPicPr>
+          <p:nvPr/>
+        </p:nvPicPr>
+        <p:blipFill>
+          <a:blip r:embed="rId4"/>
+          <a:stretch>
+            <a:fillRect/>
+          </a:stretch>
+        </p:blipFill>
+        <p:spPr>
+          <a:xfrm>
+            <a:off x="9268460" y="3712210"/>
+            <a:ext cx="1579245" cy="1118235"/>
           </a:xfrm>
           <a:prstGeom prst="rect">
             <a:avLst/>
@@ -4343,7 +4802,7 @@
       <p:grpSpPr/>
       <p:sp>
         <p:nvSpPr>
-          <p:cNvPr id="5" name="Title 4"/>
+          <p:cNvPr id="2" name="Title 1"/>
           <p:cNvSpPr>
             <a:spLocks noGrp="1"/>
           </p:cNvSpPr>
@@ -4353,24 +4812,20 @@
         </p:nvSpPr>
         <p:spPr/>
         <p:txBody>
-          <a:bodyPr>
-            <a:normAutofit/>
-          </a:bodyPr>
+          <a:bodyPr/>
           <a:p>
             <a:pPr algn="ctr"/>
             <a:r>
-              <a:rPr lang="en-US">
-                <a:sym typeface="+mn-ea"/>
-              </a:rPr>
-              <a:t>github workflow</a:t>
-            </a:r>
-            <a:endParaRPr lang="en-US"/>
+              <a:rPr lang="en-US" sz="7200"/>
+              <a:t>github</a:t>
+            </a:r>
+            <a:endParaRPr lang="en-US" sz="7200"/>
           </a:p>
         </p:txBody>
       </p:sp>
       <p:pic>
         <p:nvPicPr>
-          <p:cNvPr id="4" name="Content Placeholder 3"/>
+          <p:cNvPr id="3" name="Content Placeholder 2" descr="github-octocat"/>
           <p:cNvPicPr>
             <a:picLocks noChangeAspect="1"/>
           </p:cNvPicPr>
@@ -4380,14 +4835,15 @@
         </p:nvPicPr>
         <p:blipFill>
           <a:blip r:embed="rId1"/>
+          <a:srcRect l="23139" t="7056" r="24255"/>
           <a:stretch>
             <a:fillRect/>
           </a:stretch>
         </p:blipFill>
         <p:spPr>
           <a:xfrm>
-            <a:off x="1342390" y="1858010"/>
-            <a:ext cx="9505950" cy="4286250"/>
+            <a:off x="3264535" y="1709420"/>
+            <a:ext cx="5536565" cy="5135880"/>
           </a:xfrm>
           <a:prstGeom prst="rect">
             <a:avLst/>
@@ -4414,7 +4870,7 @@
       <p:grpSpPr/>
       <p:sp>
         <p:nvSpPr>
-          <p:cNvPr id="5" name="Title 4"/>
+          <p:cNvPr id="2" name="Title 1"/>
           <p:cNvSpPr>
             <a:spLocks noGrp="1"/>
           </p:cNvSpPr>
@@ -4424,16 +4880,39 @@
         </p:nvSpPr>
         <p:spPr/>
         <p:txBody>
-          <a:bodyPr>
-            <a:normAutofit/>
-          </a:bodyPr>
+          <a:bodyPr/>
           <a:p>
             <a:pPr algn="ctr"/>
             <a:r>
-              <a:rPr lang="en-US">
-                <a:sym typeface="+mn-ea"/>
-              </a:rPr>
-              <a:t>github workflow</a:t>
+              <a:rPr lang="en-US"/>
+              <a:t>Github</a:t>
+            </a:r>
+            <a:endParaRPr lang="en-US"/>
+          </a:p>
+        </p:txBody>
+      </p:sp>
+      <p:sp>
+        <p:nvSpPr>
+          <p:cNvPr id="4" name="Content Placeholder 3"/>
+          <p:cNvSpPr>
+            <a:spLocks noGrp="1"/>
+          </p:cNvSpPr>
+          <p:nvPr>
+            <p:ph sz="half" idx="2"/>
+          </p:nvPr>
+        </p:nvSpPr>
+        <p:spPr>
+          <a:xfrm>
+            <a:off x="838200" y="1825625"/>
+            <a:ext cx="10515600" cy="4351655"/>
+          </a:xfrm>
+        </p:spPr>
+        <p:txBody>
+          <a:bodyPr/>
+          <a:p>
+            <a:r>
+              <a:rPr lang="en-US"/>
+              <a:t>GitHub is a web-based Git repository hosting service</a:t>
             </a:r>
             <a:endParaRPr lang="en-US"/>
           </a:p>
@@ -4441,12 +4920,12 @@
       </p:sp>
       <p:pic>
         <p:nvPicPr>
-          <p:cNvPr id="4" name="Content Placeholder 3"/>
+          <p:cNvPr id="5" name="Content Placeholder 4"/>
           <p:cNvPicPr>
             <a:picLocks noChangeAspect="1"/>
           </p:cNvPicPr>
           <p:nvPr>
-            <p:ph idx="1"/>
+            <p:ph sz="half" idx="1"/>
           </p:nvPr>
         </p:nvPicPr>
         <p:blipFill>
@@ -4457,8 +4936,33 @@
         </p:blipFill>
         <p:spPr>
           <a:xfrm>
-            <a:off x="1290320" y="1858010"/>
-            <a:ext cx="9610725" cy="4286250"/>
+            <a:off x="1903730" y="2573020"/>
+            <a:ext cx="8171180" cy="3951605"/>
+          </a:xfrm>
+          <a:prstGeom prst="rect">
+            <a:avLst/>
+          </a:prstGeom>
+        </p:spPr>
+      </p:pic>
+      <p:pic>
+        <p:nvPicPr>
+          <p:cNvPr id="3" name="Content Placeholder 2" descr="github-octocat"/>
+          <p:cNvPicPr>
+            <a:picLocks noChangeAspect="1"/>
+          </p:cNvPicPr>
+          <p:nvPr/>
+        </p:nvPicPr>
+        <p:blipFill>
+          <a:blip r:embed="rId2"/>
+          <a:srcRect l="23139" t="7056" r="24255"/>
+          <a:stretch>
+            <a:fillRect/>
+          </a:stretch>
+        </p:blipFill>
+        <p:spPr>
+          <a:xfrm>
+            <a:off x="9328785" y="4340860"/>
+            <a:ext cx="2713990" cy="2517775"/>
           </a:xfrm>
           <a:prstGeom prst="rect">
             <a:avLst/>
@@ -4485,7 +4989,7 @@
       <p:grpSpPr/>
       <p:sp>
         <p:nvSpPr>
-          <p:cNvPr id="5" name="Title 4"/>
+          <p:cNvPr id="2" name="Title 1"/>
           <p:cNvSpPr>
             <a:spLocks noGrp="1"/>
           </p:cNvSpPr>
@@ -4495,15 +4999,11 @@
         </p:nvSpPr>
         <p:spPr/>
         <p:txBody>
-          <a:bodyPr>
-            <a:normAutofit/>
-          </a:bodyPr>
+          <a:bodyPr/>
           <a:p>
             <a:pPr algn="ctr"/>
             <a:r>
-              <a:rPr lang="en-US">
-                <a:sym typeface="+mn-ea"/>
-              </a:rPr>
+              <a:rPr lang="en-US"/>
               <a:t>github workflow</a:t>
             </a:r>
             <a:endParaRPr lang="en-US"/>
@@ -4512,12 +5012,12 @@
       </p:sp>
       <p:pic>
         <p:nvPicPr>
-          <p:cNvPr id="4" name="Content Placeholder 3"/>
+          <p:cNvPr id="5" name="Content Placeholder 4"/>
           <p:cNvPicPr>
             <a:picLocks noChangeAspect="1"/>
           </p:cNvPicPr>
           <p:nvPr>
-            <p:ph idx="1"/>
+            <p:ph sz="half" idx="1"/>
           </p:nvPr>
         </p:nvPicPr>
         <p:blipFill>
@@ -4528,8 +5028,8 @@
         </p:blipFill>
         <p:spPr>
           <a:xfrm>
-            <a:off x="1166495" y="1838960"/>
-            <a:ext cx="9858375" cy="4324350"/>
+            <a:off x="838200" y="1433830"/>
+            <a:ext cx="10677525" cy="4857750"/>
           </a:xfrm>
           <a:prstGeom prst="rect">
             <a:avLst/>
@@ -4566,62 +5066,144 @@
         </p:nvSpPr>
         <p:spPr/>
         <p:txBody>
-          <a:bodyPr/>
-          <a:p>
-            <a:endParaRPr lang="en-US"/>
-          </a:p>
-        </p:txBody>
-      </p:sp>
-      <p:sp>
-        <p:nvSpPr>
-          <p:cNvPr id="3" name="Content Placeholder 2"/>
-          <p:cNvSpPr>
-            <a:spLocks noGrp="1"/>
-          </p:cNvSpPr>
+          <a:bodyPr>
+            <a:normAutofit/>
+          </a:bodyPr>
+          <a:p>
+            <a:pPr algn="ctr"/>
+            <a:r>
+              <a:rPr lang="en-US">
+                <a:sym typeface="+mn-ea"/>
+              </a:rPr>
+              <a:t>github workflow</a:t>
+            </a:r>
+            <a:endParaRPr lang="en-US"/>
+          </a:p>
+        </p:txBody>
+      </p:sp>
+      <p:pic>
+        <p:nvPicPr>
+          <p:cNvPr id="5" name="Content Placeholder 4"/>
+          <p:cNvPicPr>
+            <a:picLocks noChangeAspect="1"/>
+          </p:cNvPicPr>
           <p:nvPr>
             <p:ph idx="1"/>
           </p:nvPr>
+        </p:nvPicPr>
+        <p:blipFill>
+          <a:blip r:embed="rId1"/>
+          <a:srcRect b="3710"/>
+          <a:stretch>
+            <a:fillRect/>
+          </a:stretch>
+        </p:blipFill>
+        <p:spPr>
+          <a:xfrm>
+            <a:off x="1619250" y="1821180"/>
+            <a:ext cx="9734550" cy="4136390"/>
+          </a:xfrm>
+          <a:prstGeom prst="rect">
+            <a:avLst/>
+          </a:prstGeom>
+        </p:spPr>
+      </p:pic>
+    </p:spTree>
+  </p:cSld>
+  <p:clrMapOvr>
+    <a:masterClrMapping/>
+  </p:clrMapOvr>
+</p:sld>
+</file>
+
+<file path=ppt/slides/slide29.xml><?xml version="1.0" encoding="utf-8"?>
+<p:sld xmlns:a="http://schemas.openxmlformats.org/drawingml/2006/main" xmlns:r="http://schemas.openxmlformats.org/officeDocument/2006/relationships" xmlns:p="http://schemas.openxmlformats.org/presentationml/2006/main">
+  <p:cSld>
+    <p:spTree>
+      <p:nvGrpSpPr>
+        <p:cNvPr id="1" name=""/>
+        <p:cNvGrpSpPr/>
+        <p:nvPr/>
+      </p:nvGrpSpPr>
+      <p:grpSpPr/>
+      <p:sp>
+        <p:nvSpPr>
+          <p:cNvPr id="5" name="Title 4"/>
+          <p:cNvSpPr>
+            <a:spLocks noGrp="1"/>
+          </p:cNvSpPr>
+          <p:nvPr>
+            <p:ph type="title"/>
+          </p:nvPr>
         </p:nvSpPr>
         <p:spPr/>
         <p:txBody>
           <a:bodyPr>
-            <a:normAutofit lnSpcReduction="10000"/>
+            <a:normAutofit/>
           </a:bodyPr>
           <a:p>
-            <a:pPr marL="0" indent="0">
-              <a:buNone/>
-            </a:pPr>
-            <a:r>
-              <a:rPr lang="en-US"/>
-              <a:t>Here at GitHub, our developers, writers, and designers use branches for keeping bug fixes and feature work separate from our master (production) branch. When a change is ready, they merge their branch into master.</a:t>
-            </a:r>
-            <a:endParaRPr lang="en-US"/>
-          </a:p>
-          <a:p>
-            <a:pPr marL="0" indent="0">
-              <a:buNone/>
-            </a:pPr>
-            <a:r>
-              <a:rPr lang="en-US"/>
-              <a:t>Ketika ada masalah dalam satu fitur, maka yang diedit adalah branch fitur yang bersangkutan tanpa mengoprek atau merubah branch master, ketika perubahan itu sudah siap. baru dilakukan merge ulang,</a:t>
-            </a:r>
-            <a:endParaRPr lang="en-US"/>
-          </a:p>
-          <a:p>
-            <a:pPr marL="0" indent="0">
-              <a:buNone/>
-            </a:pPr>
-            <a:endParaRPr lang="en-US"/>
-          </a:p>
-          <a:p>
-            <a:pPr marL="0" indent="0">
-              <a:buNone/>
-            </a:pPr>
-            <a:endParaRPr lang="en-US"/>
-          </a:p>
-          <a:p>
-            <a:r>
-              <a:rPr lang="en-US"/>
+            <a:pPr algn="ctr"/>
+            <a:r>
+              <a:rPr lang="en-US">
+                <a:sym typeface="+mn-ea"/>
+              </a:rPr>
+              <a:t>github workflow</a:t>
+            </a:r>
+            <a:endParaRPr lang="en-US"/>
+          </a:p>
+        </p:txBody>
+      </p:sp>
+      <p:pic>
+        <p:nvPicPr>
+          <p:cNvPr id="4" name="Content Placeholder 3"/>
+          <p:cNvPicPr>
+            <a:picLocks noChangeAspect="1"/>
+          </p:cNvPicPr>
+          <p:nvPr>
+            <p:ph idx="1"/>
+          </p:nvPr>
+        </p:nvPicPr>
+        <p:blipFill>
+          <a:blip r:embed="rId1"/>
+          <a:stretch>
+            <a:fillRect/>
+          </a:stretch>
+        </p:blipFill>
+        <p:spPr>
+          <a:xfrm>
+            <a:off x="1390015" y="1896110"/>
+            <a:ext cx="9410700" cy="4210050"/>
+          </a:xfrm>
+          <a:prstGeom prst="rect">
+            <a:avLst/>
+          </a:prstGeom>
+        </p:spPr>
+      </p:pic>
+      <p:sp>
+        <p:nvSpPr>
+          <p:cNvPr id="2" name="Text Box 1"/>
+          <p:cNvSpPr txBox="1"/>
+          <p:nvPr/>
+        </p:nvSpPr>
+        <p:spPr>
+          <a:xfrm>
+            <a:off x="8009255" y="5737860"/>
+            <a:ext cx="2791460" cy="368300"/>
+          </a:xfrm>
+          <a:prstGeom prst="rect">
+            <a:avLst/>
+          </a:prstGeom>
+          <a:noFill/>
+        </p:spPr>
+        <p:txBody>
+          <a:bodyPr wrap="square" rtlCol="0" anchor="t">
+            <a:spAutoFit/>
+          </a:bodyPr>
+          <a:p>
+            <a:r>
+              <a:rPr lang="en-US">
+                <a:sym typeface="+mn-ea"/>
+              </a:rPr>
               <a:t>https://guides.github.com/</a:t>
             </a:r>
             <a:endParaRPr lang="en-US"/>
@@ -4662,7 +5244,7 @@
           <a:p>
             <a:r>
               <a:rPr lang="en-US"/>
-              <a:t>Use Case</a:t>
+              <a:t>Use Cases</a:t>
             </a:r>
             <a:endParaRPr lang="en-US"/>
           </a:p>
@@ -4686,14 +5268,412 @@
         </p:blipFill>
         <p:spPr>
           <a:xfrm>
-            <a:off x="3935095" y="673735"/>
-            <a:ext cx="5464175" cy="5503545"/>
+            <a:off x="838200" y="2365375"/>
+            <a:ext cx="10885170" cy="2517775"/>
           </a:xfrm>
           <a:prstGeom prst="rect">
             <a:avLst/>
           </a:prstGeom>
         </p:spPr>
       </p:pic>
+    </p:spTree>
+  </p:cSld>
+  <p:clrMapOvr>
+    <a:masterClrMapping/>
+  </p:clrMapOvr>
+</p:sld>
+</file>
+
+<file path=ppt/slides/slide30.xml><?xml version="1.0" encoding="utf-8"?>
+<p:sld xmlns:a="http://schemas.openxmlformats.org/drawingml/2006/main" xmlns:r="http://schemas.openxmlformats.org/officeDocument/2006/relationships" xmlns:p="http://schemas.openxmlformats.org/presentationml/2006/main">
+  <p:cSld>
+    <p:spTree>
+      <p:nvGrpSpPr>
+        <p:cNvPr id="1" name=""/>
+        <p:cNvGrpSpPr/>
+        <p:nvPr/>
+      </p:nvGrpSpPr>
+      <p:grpSpPr/>
+      <p:sp>
+        <p:nvSpPr>
+          <p:cNvPr id="5" name="Title 4"/>
+          <p:cNvSpPr>
+            <a:spLocks noGrp="1"/>
+          </p:cNvSpPr>
+          <p:nvPr>
+            <p:ph type="title"/>
+          </p:nvPr>
+        </p:nvSpPr>
+        <p:spPr/>
+        <p:txBody>
+          <a:bodyPr>
+            <a:normAutofit/>
+          </a:bodyPr>
+          <a:p>
+            <a:pPr algn="ctr"/>
+            <a:r>
+              <a:rPr lang="en-US">
+                <a:sym typeface="+mn-ea"/>
+              </a:rPr>
+              <a:t>github workflow</a:t>
+            </a:r>
+            <a:endParaRPr lang="en-US"/>
+          </a:p>
+        </p:txBody>
+      </p:sp>
+      <p:pic>
+        <p:nvPicPr>
+          <p:cNvPr id="4" name="Content Placeholder 3"/>
+          <p:cNvPicPr>
+            <a:picLocks noChangeAspect="1"/>
+          </p:cNvPicPr>
+          <p:nvPr>
+            <p:ph idx="1"/>
+          </p:nvPr>
+        </p:nvPicPr>
+        <p:blipFill>
+          <a:blip r:embed="rId1"/>
+          <a:stretch>
+            <a:fillRect/>
+          </a:stretch>
+        </p:blipFill>
+        <p:spPr>
+          <a:xfrm>
+            <a:off x="1342390" y="1858010"/>
+            <a:ext cx="9505950" cy="4286250"/>
+          </a:xfrm>
+          <a:prstGeom prst="rect">
+            <a:avLst/>
+          </a:prstGeom>
+        </p:spPr>
+      </p:pic>
+      <p:sp>
+        <p:nvSpPr>
+          <p:cNvPr id="2" name="Text Box 1"/>
+          <p:cNvSpPr txBox="1"/>
+          <p:nvPr/>
+        </p:nvSpPr>
+        <p:spPr>
+          <a:xfrm>
+            <a:off x="8056880" y="5960745"/>
+            <a:ext cx="2791460" cy="368300"/>
+          </a:xfrm>
+          <a:prstGeom prst="rect">
+            <a:avLst/>
+          </a:prstGeom>
+          <a:noFill/>
+        </p:spPr>
+        <p:txBody>
+          <a:bodyPr wrap="square" rtlCol="0" anchor="t">
+            <a:spAutoFit/>
+          </a:bodyPr>
+          <a:p>
+            <a:r>
+              <a:rPr lang="en-US">
+                <a:sym typeface="+mn-ea"/>
+              </a:rPr>
+              <a:t>https://guides.github.com/</a:t>
+            </a:r>
+            <a:endParaRPr lang="en-US"/>
+          </a:p>
+        </p:txBody>
+      </p:sp>
+    </p:spTree>
+  </p:cSld>
+  <p:clrMapOvr>
+    <a:masterClrMapping/>
+  </p:clrMapOvr>
+</p:sld>
+</file>
+
+<file path=ppt/slides/slide31.xml><?xml version="1.0" encoding="utf-8"?>
+<p:sld xmlns:a="http://schemas.openxmlformats.org/drawingml/2006/main" xmlns:r="http://schemas.openxmlformats.org/officeDocument/2006/relationships" xmlns:p="http://schemas.openxmlformats.org/presentationml/2006/main">
+  <p:cSld>
+    <p:spTree>
+      <p:nvGrpSpPr>
+        <p:cNvPr id="1" name=""/>
+        <p:cNvGrpSpPr/>
+        <p:nvPr/>
+      </p:nvGrpSpPr>
+      <p:grpSpPr/>
+      <p:sp>
+        <p:nvSpPr>
+          <p:cNvPr id="5" name="Title 4"/>
+          <p:cNvSpPr>
+            <a:spLocks noGrp="1"/>
+          </p:cNvSpPr>
+          <p:nvPr>
+            <p:ph type="title"/>
+          </p:nvPr>
+        </p:nvSpPr>
+        <p:spPr/>
+        <p:txBody>
+          <a:bodyPr>
+            <a:normAutofit/>
+          </a:bodyPr>
+          <a:p>
+            <a:pPr algn="ctr"/>
+            <a:r>
+              <a:rPr lang="en-US">
+                <a:sym typeface="+mn-ea"/>
+              </a:rPr>
+              <a:t>github workflow</a:t>
+            </a:r>
+            <a:endParaRPr lang="en-US"/>
+          </a:p>
+        </p:txBody>
+      </p:sp>
+      <p:pic>
+        <p:nvPicPr>
+          <p:cNvPr id="4" name="Content Placeholder 3"/>
+          <p:cNvPicPr>
+            <a:picLocks noChangeAspect="1"/>
+          </p:cNvPicPr>
+          <p:nvPr>
+            <p:ph idx="1"/>
+          </p:nvPr>
+        </p:nvPicPr>
+        <p:blipFill>
+          <a:blip r:embed="rId1"/>
+          <a:stretch>
+            <a:fillRect/>
+          </a:stretch>
+        </p:blipFill>
+        <p:spPr>
+          <a:xfrm>
+            <a:off x="1290320" y="1858010"/>
+            <a:ext cx="9610725" cy="4286250"/>
+          </a:xfrm>
+          <a:prstGeom prst="rect">
+            <a:avLst/>
+          </a:prstGeom>
+        </p:spPr>
+      </p:pic>
+      <p:sp>
+        <p:nvSpPr>
+          <p:cNvPr id="2" name="Text Box 1"/>
+          <p:cNvSpPr txBox="1"/>
+          <p:nvPr/>
+        </p:nvSpPr>
+        <p:spPr>
+          <a:xfrm>
+            <a:off x="8232140" y="5897245"/>
+            <a:ext cx="2791460" cy="368300"/>
+          </a:xfrm>
+          <a:prstGeom prst="rect">
+            <a:avLst/>
+          </a:prstGeom>
+          <a:noFill/>
+        </p:spPr>
+        <p:txBody>
+          <a:bodyPr wrap="square" rtlCol="0" anchor="t">
+            <a:spAutoFit/>
+          </a:bodyPr>
+          <a:p>
+            <a:r>
+              <a:rPr lang="en-US">
+                <a:sym typeface="+mn-ea"/>
+              </a:rPr>
+              <a:t>https://guides.github.com/</a:t>
+            </a:r>
+            <a:endParaRPr lang="en-US"/>
+          </a:p>
+        </p:txBody>
+      </p:sp>
+    </p:spTree>
+  </p:cSld>
+  <p:clrMapOvr>
+    <a:masterClrMapping/>
+  </p:clrMapOvr>
+</p:sld>
+</file>
+
+<file path=ppt/slides/slide32.xml><?xml version="1.0" encoding="utf-8"?>
+<p:sld xmlns:a="http://schemas.openxmlformats.org/drawingml/2006/main" xmlns:r="http://schemas.openxmlformats.org/officeDocument/2006/relationships" xmlns:p="http://schemas.openxmlformats.org/presentationml/2006/main">
+  <p:cSld>
+    <p:spTree>
+      <p:nvGrpSpPr>
+        <p:cNvPr id="1" name=""/>
+        <p:cNvGrpSpPr/>
+        <p:nvPr/>
+      </p:nvGrpSpPr>
+      <p:grpSpPr/>
+      <p:sp>
+        <p:nvSpPr>
+          <p:cNvPr id="5" name="Title 4"/>
+          <p:cNvSpPr>
+            <a:spLocks noGrp="1"/>
+          </p:cNvSpPr>
+          <p:nvPr>
+            <p:ph type="title"/>
+          </p:nvPr>
+        </p:nvSpPr>
+        <p:spPr/>
+        <p:txBody>
+          <a:bodyPr>
+            <a:normAutofit/>
+          </a:bodyPr>
+          <a:p>
+            <a:pPr algn="ctr"/>
+            <a:r>
+              <a:rPr lang="en-US">
+                <a:sym typeface="+mn-ea"/>
+              </a:rPr>
+              <a:t>github workflow</a:t>
+            </a:r>
+            <a:endParaRPr lang="en-US"/>
+          </a:p>
+        </p:txBody>
+      </p:sp>
+      <p:pic>
+        <p:nvPicPr>
+          <p:cNvPr id="4" name="Content Placeholder 3"/>
+          <p:cNvPicPr>
+            <a:picLocks noChangeAspect="1"/>
+          </p:cNvPicPr>
+          <p:nvPr>
+            <p:ph idx="1"/>
+          </p:nvPr>
+        </p:nvPicPr>
+        <p:blipFill>
+          <a:blip r:embed="rId1"/>
+          <a:stretch>
+            <a:fillRect/>
+          </a:stretch>
+        </p:blipFill>
+        <p:spPr>
+          <a:xfrm>
+            <a:off x="1166495" y="1838960"/>
+            <a:ext cx="9858375" cy="4324350"/>
+          </a:xfrm>
+          <a:prstGeom prst="rect">
+            <a:avLst/>
+          </a:prstGeom>
+        </p:spPr>
+      </p:pic>
+      <p:sp>
+        <p:nvSpPr>
+          <p:cNvPr id="2" name="Text Box 1"/>
+          <p:cNvSpPr txBox="1"/>
+          <p:nvPr/>
+        </p:nvSpPr>
+        <p:spPr>
+          <a:xfrm>
+            <a:off x="7992745" y="5913120"/>
+            <a:ext cx="2791460" cy="368300"/>
+          </a:xfrm>
+          <a:prstGeom prst="rect">
+            <a:avLst/>
+          </a:prstGeom>
+          <a:noFill/>
+        </p:spPr>
+        <p:txBody>
+          <a:bodyPr wrap="square" rtlCol="0" anchor="t">
+            <a:spAutoFit/>
+          </a:bodyPr>
+          <a:p>
+            <a:r>
+              <a:rPr lang="en-US">
+                <a:sym typeface="+mn-ea"/>
+              </a:rPr>
+              <a:t>https://guides.github.com/</a:t>
+            </a:r>
+            <a:endParaRPr lang="en-US"/>
+          </a:p>
+        </p:txBody>
+      </p:sp>
+    </p:spTree>
+  </p:cSld>
+  <p:clrMapOvr>
+    <a:masterClrMapping/>
+  </p:clrMapOvr>
+</p:sld>
+</file>
+
+<file path=ppt/slides/slide33.xml><?xml version="1.0" encoding="utf-8"?>
+<p:sld xmlns:a="http://schemas.openxmlformats.org/drawingml/2006/main" xmlns:r="http://schemas.openxmlformats.org/officeDocument/2006/relationships" xmlns:p="http://schemas.openxmlformats.org/presentationml/2006/main">
+  <p:cSld>
+    <p:spTree>
+      <p:nvGrpSpPr>
+        <p:cNvPr id="1" name=""/>
+        <p:cNvGrpSpPr/>
+        <p:nvPr/>
+      </p:nvGrpSpPr>
+      <p:grpSpPr/>
+      <p:sp>
+        <p:nvSpPr>
+          <p:cNvPr id="2" name="Title 1"/>
+          <p:cNvSpPr>
+            <a:spLocks noGrp="1"/>
+          </p:cNvSpPr>
+          <p:nvPr>
+            <p:ph type="title"/>
+          </p:nvPr>
+        </p:nvSpPr>
+        <p:spPr>
+          <a:xfrm>
+            <a:off x="838200" y="2943225"/>
+            <a:ext cx="10515600" cy="1325563"/>
+          </a:xfrm>
+        </p:spPr>
+        <p:txBody>
+          <a:bodyPr/>
+          <a:p>
+            <a:pPr algn="ctr"/>
+            <a:r>
+              <a:rPr lang="en-US"/>
+              <a:t>DEMO</a:t>
+            </a:r>
+            <a:endParaRPr lang="en-US"/>
+          </a:p>
+        </p:txBody>
+      </p:sp>
+    </p:spTree>
+  </p:cSld>
+  <p:clrMapOvr>
+    <a:masterClrMapping/>
+  </p:clrMapOvr>
+</p:sld>
+</file>
+
+<file path=ppt/slides/slide34.xml><?xml version="1.0" encoding="utf-8"?>
+<p:sld xmlns:a="http://schemas.openxmlformats.org/drawingml/2006/main" xmlns:r="http://schemas.openxmlformats.org/officeDocument/2006/relationships" xmlns:p="http://schemas.openxmlformats.org/presentationml/2006/main">
+  <p:cSld>
+    <p:spTree>
+      <p:nvGrpSpPr>
+        <p:cNvPr id="1" name=""/>
+        <p:cNvGrpSpPr/>
+        <p:nvPr/>
+      </p:nvGrpSpPr>
+      <p:grpSpPr/>
+      <p:sp>
+        <p:nvSpPr>
+          <p:cNvPr id="2" name="Title 1"/>
+          <p:cNvSpPr>
+            <a:spLocks noGrp="1"/>
+          </p:cNvSpPr>
+          <p:nvPr>
+            <p:ph type="title"/>
+          </p:nvPr>
+        </p:nvSpPr>
+        <p:spPr>
+          <a:xfrm>
+            <a:off x="934085" y="2766060"/>
+            <a:ext cx="10515600" cy="1325563"/>
+          </a:xfrm>
+        </p:spPr>
+        <p:txBody>
+          <a:bodyPr/>
+          <a:p>
+            <a:pPr algn="ctr"/>
+            <a:r>
+              <a:rPr lang="en-US"/>
+              <a:t>THANK YOU FOR WATCHING</a:t>
+            </a:r>
+            <a:endParaRPr lang="en-US"/>
+          </a:p>
+        </p:txBody>
+      </p:sp>
     </p:spTree>
   </p:cSld>
   <p:clrMapOvr>
@@ -4726,9 +5706,10 @@
         <p:txBody>
           <a:bodyPr/>
           <a:p>
+            <a:pPr algn="ctr"/>
             <a:r>
               <a:rPr lang="en-US"/>
-              <a:t>Fork</a:t>
+              <a:t>Use Cases</a:t>
             </a:r>
             <a:endParaRPr lang="en-US"/>
           </a:p>
@@ -4748,11 +5729,28 @@
         <p:txBody>
           <a:bodyPr/>
           <a:p>
-            <a:r>
-              <a:rPr lang="en-US"/>
-              <a:t>menyalin</a:t>
-            </a:r>
-            <a:endParaRPr lang="en-US"/>
+            <a:pPr marL="0" indent="0">
+              <a:buNone/>
+            </a:pPr>
+            <a:r>
+              <a:rPr lang="en-US" sz="3600"/>
+              <a:t>Consider this scenario:</a:t>
+            </a:r>
+            <a:endParaRPr lang="en-US" sz="3600"/>
+          </a:p>
+          <a:p>
+            <a:r>
+              <a:rPr lang="en-US" sz="3600"/>
+              <a:t>You have a homework submission in Matam for today and the assignment is ready for submission</a:t>
+            </a:r>
+            <a:endParaRPr lang="en-US" sz="3600"/>
+          </a:p>
+          <a:p>
+            <a:r>
+              <a:rPr lang="en-US" sz="3600"/>
+              <a:t>While testing it you discovered a minor bug and decided to fix it</a:t>
+            </a:r>
+            <a:endParaRPr lang="en-US" sz="3600"/>
           </a:p>
         </p:txBody>
       </p:sp>
@@ -4776,7 +5774,7 @@
       <p:grpSpPr/>
       <p:sp>
         <p:nvSpPr>
-          <p:cNvPr id="5" name="Title 4"/>
+          <p:cNvPr id="2" name="Title 1"/>
           <p:cNvSpPr>
             <a:spLocks noGrp="1"/>
           </p:cNvSpPr>
@@ -4790,38 +5788,48 @@
           <a:p>
             <a:r>
               <a:rPr lang="en-US"/>
-              <a:t>Use Cases</a:t>
-            </a:r>
-            <a:endParaRPr lang="en-US"/>
-          </a:p>
-        </p:txBody>
-      </p:sp>
-      <p:pic>
-        <p:nvPicPr>
-          <p:cNvPr id="4" name="Content Placeholder 3"/>
-          <p:cNvPicPr>
-            <a:picLocks noChangeAspect="1"/>
-          </p:cNvPicPr>
+              <a:t>Use cases</a:t>
+            </a:r>
+            <a:endParaRPr lang="en-US"/>
+          </a:p>
+        </p:txBody>
+      </p:sp>
+      <p:sp>
+        <p:nvSpPr>
+          <p:cNvPr id="3" name="Content Placeholder 2"/>
+          <p:cNvSpPr>
+            <a:spLocks noGrp="1"/>
+          </p:cNvSpPr>
           <p:nvPr>
             <p:ph idx="1"/>
           </p:nvPr>
-        </p:nvPicPr>
-        <p:blipFill>
-          <a:blip r:embed="rId1"/>
-          <a:stretch>
-            <a:fillRect/>
-          </a:stretch>
-        </p:blipFill>
-        <p:spPr>
-          <a:xfrm>
-            <a:off x="838200" y="2365375"/>
-            <a:ext cx="10885170" cy="2517775"/>
-          </a:xfrm>
-          <a:prstGeom prst="rect">
-            <a:avLst/>
-          </a:prstGeom>
-        </p:spPr>
-      </p:pic>
+        </p:nvSpPr>
+        <p:spPr/>
+        <p:txBody>
+          <a:bodyPr/>
+          <a:p>
+            <a:r>
+              <a:rPr lang="en-US" sz="3600"/>
+              <a:t>After attempting to do so, you accidentally changed a working code and got yourself in a big mess</a:t>
+            </a:r>
+            <a:endParaRPr lang="en-US" sz="3600"/>
+          </a:p>
+          <a:p>
+            <a:r>
+              <a:rPr lang="en-US" sz="3600"/>
+              <a:t>You no longer remember what was and what wasn’t there</a:t>
+            </a:r>
+            <a:endParaRPr lang="en-US" sz="3600"/>
+          </a:p>
+          <a:p>
+            <a:r>
+              <a:rPr lang="en-US" sz="3600"/>
+              <a:t>It is 23:58 PM</a:t>
+            </a:r>
+            <a:endParaRPr lang="en-US" sz="3600"/>
+          </a:p>
+        </p:txBody>
+      </p:sp>
     </p:spTree>
   </p:cSld>
   <p:clrMapOvr>
@@ -4840,68 +5848,32 @@
         <p:nvPr/>
       </p:nvGrpSpPr>
       <p:grpSpPr/>
-      <p:sp>
-        <p:nvSpPr>
-          <p:cNvPr id="2" name="Title 1"/>
-          <p:cNvSpPr>
-            <a:spLocks noGrp="1"/>
-          </p:cNvSpPr>
-          <p:nvPr>
-            <p:ph type="title"/>
-          </p:nvPr>
-        </p:nvSpPr>
-        <p:spPr/>
-        <p:txBody>
-          <a:bodyPr/>
-          <a:p>
-            <a:pPr algn="ctr"/>
-            <a:r>
-              <a:rPr lang="en-US"/>
-              <a:t>Use Cases</a:t>
-            </a:r>
-            <a:endParaRPr lang="en-US"/>
-          </a:p>
-        </p:txBody>
-      </p:sp>
-      <p:sp>
-        <p:nvSpPr>
-          <p:cNvPr id="3" name="Content Placeholder 2"/>
-          <p:cNvSpPr>
-            <a:spLocks noGrp="1"/>
-          </p:cNvSpPr>
+      <p:pic>
+        <p:nvPicPr>
+          <p:cNvPr id="4" name="Content Placeholder 3"/>
+          <p:cNvPicPr>
+            <a:picLocks noChangeAspect="1"/>
+          </p:cNvPicPr>
           <p:nvPr>
             <p:ph idx="1"/>
           </p:nvPr>
-        </p:nvSpPr>
-        <p:spPr/>
-        <p:txBody>
-          <a:bodyPr/>
-          <a:p>
-            <a:pPr marL="0" indent="0">
-              <a:buNone/>
-            </a:pPr>
-            <a:r>
-              <a:rPr lang="en-US" sz="3600"/>
-              <a:t>Consider this scenario:</a:t>
-            </a:r>
-            <a:endParaRPr lang="en-US" sz="3600"/>
-          </a:p>
-          <a:p>
-            <a:r>
-              <a:rPr lang="en-US" sz="3600"/>
-              <a:t>You have a homework submission in Matam for today and the assignment is ready for submission</a:t>
-            </a:r>
-            <a:endParaRPr lang="en-US" sz="3600"/>
-          </a:p>
-          <a:p>
-            <a:r>
-              <a:rPr lang="en-US" sz="3600"/>
-              <a:t>While testing it you discovered a minor bug and decided to fix it</a:t>
-            </a:r>
-            <a:endParaRPr lang="en-US" sz="3600"/>
-          </a:p>
-        </p:txBody>
-      </p:sp>
+        </p:nvPicPr>
+        <p:blipFill>
+          <a:blip r:embed="rId1"/>
+          <a:stretch>
+            <a:fillRect/>
+          </a:stretch>
+        </p:blipFill>
+        <p:spPr>
+          <a:xfrm>
+            <a:off x="2338705" y="608965"/>
+            <a:ext cx="7513955" cy="5640705"/>
+          </a:xfrm>
+          <a:prstGeom prst="rect">
+            <a:avLst/>
+          </a:prstGeom>
+        </p:spPr>
+      </p:pic>
     </p:spTree>
   </p:cSld>
   <p:clrMapOvr>
@@ -4934,50 +5906,42 @@
         <p:txBody>
           <a:bodyPr/>
           <a:p>
-            <a:r>
-              <a:rPr lang="en-US"/>
-              <a:t>Use cases</a:t>
-            </a:r>
-            <a:endParaRPr lang="en-US"/>
-          </a:p>
-        </p:txBody>
-      </p:sp>
-      <p:sp>
-        <p:nvSpPr>
-          <p:cNvPr id="3" name="Content Placeholder 2"/>
-          <p:cNvSpPr>
-            <a:spLocks noGrp="1"/>
-          </p:cNvSpPr>
+            <a:pPr algn="ctr"/>
+            <a:r>
+              <a:rPr lang="en-US" sz="6600"/>
+              <a:t>What is git?</a:t>
+            </a:r>
+            <a:endParaRPr lang="en-US" sz="6600"/>
+          </a:p>
+        </p:txBody>
+      </p:sp>
+      <p:pic>
+        <p:nvPicPr>
+          <p:cNvPr id="4" name="Content Placeholder 3" descr="Git-Logo-2Color"/>
+          <p:cNvPicPr>
+            <a:picLocks noChangeAspect="1"/>
+          </p:cNvPicPr>
           <p:nvPr>
             <p:ph idx="1"/>
           </p:nvPr>
-        </p:nvSpPr>
-        <p:spPr/>
-        <p:txBody>
-          <a:bodyPr/>
-          <a:p>
-            <a:r>
-              <a:rPr lang="en-US"/>
-              <a:t>After attempting to do so, you accidentally changed a working code and got yourself in a big mess</a:t>
-            </a:r>
-            <a:endParaRPr lang="en-US"/>
-          </a:p>
-          <a:p>
-            <a:r>
-              <a:rPr lang="en-US"/>
-              <a:t>You no longer remember what was and what wasn’t there</a:t>
-            </a:r>
-            <a:endParaRPr lang="en-US"/>
-          </a:p>
-          <a:p>
-            <a:r>
-              <a:rPr lang="en-US"/>
-              <a:t>It is 23:58 PM</a:t>
-            </a:r>
-            <a:endParaRPr lang="en-US"/>
-          </a:p>
-        </p:txBody>
-      </p:sp>
+        </p:nvPicPr>
+        <p:blipFill>
+          <a:blip r:embed="rId1"/>
+          <a:srcRect r="57949"/>
+          <a:stretch>
+            <a:fillRect/>
+          </a:stretch>
+        </p:blipFill>
+        <p:spPr>
+          <a:xfrm>
+            <a:off x="4273550" y="1691005"/>
+            <a:ext cx="3644900" cy="3619500"/>
+          </a:xfrm>
+          <a:prstGeom prst="rect">
+            <a:avLst/>
+          </a:prstGeom>
+        </p:spPr>
+      </p:pic>
     </p:spTree>
   </p:cSld>
   <p:clrMapOvr>
@@ -4996,32 +5960,116 @@
         <p:nvPr/>
       </p:nvGrpSpPr>
       <p:grpSpPr/>
-      <p:pic>
-        <p:nvPicPr>
-          <p:cNvPr id="4" name="Content Placeholder 3"/>
-          <p:cNvPicPr>
-            <a:picLocks noChangeAspect="1"/>
-          </p:cNvPicPr>
+      <p:sp>
+        <p:nvSpPr>
+          <p:cNvPr id="2" name="Title 1"/>
+          <p:cNvSpPr>
+            <a:spLocks noGrp="1"/>
+          </p:cNvSpPr>
+          <p:nvPr>
+            <p:ph type="title"/>
+          </p:nvPr>
+        </p:nvSpPr>
+        <p:spPr/>
+        <p:txBody>
+          <a:bodyPr/>
+          <a:p>
+            <a:pPr algn="ctr"/>
+            <a:r>
+              <a:rPr lang="en-US" sz="6600"/>
+              <a:t>What is git?</a:t>
+            </a:r>
+            <a:endParaRPr lang="en-US" sz="6600"/>
+          </a:p>
+        </p:txBody>
+      </p:sp>
+      <p:sp>
+        <p:nvSpPr>
+          <p:cNvPr id="3" name="Content Placeholder 2"/>
+          <p:cNvSpPr>
+            <a:spLocks noGrp="1"/>
+          </p:cNvSpPr>
           <p:nvPr>
             <p:ph idx="1"/>
           </p:nvPr>
-        </p:nvPicPr>
-        <p:blipFill>
-          <a:blip r:embed="rId1"/>
-          <a:stretch>
-            <a:fillRect/>
-          </a:stretch>
-        </p:blipFill>
-        <p:spPr>
-          <a:xfrm>
-            <a:off x="2338705" y="608965"/>
-            <a:ext cx="7513955" cy="5640705"/>
-          </a:xfrm>
-          <a:prstGeom prst="rect">
-            <a:avLst/>
-          </a:prstGeom>
-        </p:spPr>
-      </p:pic>
+        </p:nvSpPr>
+        <p:spPr/>
+        <p:txBody>
+          <a:bodyPr/>
+          <a:p>
+            <a:r>
+              <a:rPr lang="en-US"/>
+              <a:t>Open source project originally developed in 2005 by </a:t>
+            </a:r>
+            <a:r>
+              <a:rPr lang="en-US">
+                <a:solidFill>
+                  <a:srgbClr val="FF0000"/>
+                </a:solidFill>
+              </a:rPr>
+              <a:t>Linus Torvalds</a:t>
+            </a:r>
+            <a:endParaRPr lang="en-US"/>
+          </a:p>
+          <a:p>
+            <a:r>
+              <a:rPr lang="en-US"/>
+              <a:t>A </a:t>
+            </a:r>
+            <a:r>
+              <a:rPr lang="en-US">
+                <a:solidFill>
+                  <a:srgbClr val="FF0000"/>
+                </a:solidFill>
+              </a:rPr>
+              <a:t>command line</a:t>
+            </a:r>
+            <a:r>
+              <a:rPr lang="en-US"/>
+              <a:t> utility</a:t>
+            </a:r>
+            <a:endParaRPr lang="en-US"/>
+          </a:p>
+          <a:p>
+            <a:r>
+              <a:rPr lang="en-US"/>
+              <a:t>You can imagine </a:t>
+            </a:r>
+            <a:r>
+              <a:rPr lang="en-US">
+                <a:solidFill>
+                  <a:srgbClr val="FF0000"/>
+                </a:solidFill>
+              </a:rPr>
+              <a:t>git</a:t>
+            </a:r>
+            <a:r>
+              <a:rPr lang="en-US"/>
+              <a:t> as something that sits on top of your file system and manipulates files</a:t>
+            </a:r>
+            <a:endParaRPr lang="en-US"/>
+          </a:p>
+          <a:p>
+            <a:r>
+              <a:rPr lang="en-US"/>
+              <a:t>A distributed version control system - </a:t>
+            </a:r>
+            <a:r>
+              <a:rPr lang="en-US">
+                <a:solidFill>
+                  <a:srgbClr val="C00000"/>
+                </a:solidFill>
+              </a:rPr>
+              <a:t>DCVS</a:t>
+            </a:r>
+            <a:endParaRPr lang="en-US">
+              <a:solidFill>
+                <a:srgbClr val="C00000"/>
+              </a:solidFill>
+            </a:endParaRPr>
+          </a:p>
+        </p:txBody>
+      </p:sp>
     </p:spTree>
   </p:cSld>
   <p:clrMapOvr>
@@ -5052,44 +6100,81 @@
         </p:nvSpPr>
         <p:spPr/>
         <p:txBody>
-          <a:bodyPr/>
-          <a:p>
-            <a:pPr algn="ctr"/>
-            <a:r>
-              <a:rPr lang="en-US" sz="6600"/>
-              <a:t>What is git?</a:t>
-            </a:r>
-            <a:endParaRPr lang="en-US" sz="6600"/>
-          </a:p>
-        </p:txBody>
-      </p:sp>
-      <p:pic>
-        <p:nvPicPr>
-          <p:cNvPr id="4" name="Content Placeholder 3" descr="Git-Logo-2Color"/>
-          <p:cNvPicPr>
-            <a:picLocks noChangeAspect="1"/>
-          </p:cNvPicPr>
+          <a:bodyPr>
+            <a:normAutofit/>
+          </a:bodyPr>
+          <a:p>
+            <a:r>
+              <a:rPr lang="en-US">
+                <a:sym typeface="+mn-ea"/>
+              </a:rPr>
+              <a:t>What is “distributed version control system” ?</a:t>
+            </a:r>
+            <a:endParaRPr lang="en-US"/>
+          </a:p>
+        </p:txBody>
+      </p:sp>
+      <p:sp>
+        <p:nvSpPr>
+          <p:cNvPr id="3" name="Content Placeholder 2"/>
+          <p:cNvSpPr>
+            <a:spLocks noGrp="1"/>
+          </p:cNvSpPr>
           <p:nvPr>
             <p:ph idx="1"/>
           </p:nvPr>
-        </p:nvPicPr>
-        <p:blipFill>
-          <a:blip r:embed="rId1"/>
-          <a:srcRect r="57949"/>
-          <a:stretch>
-            <a:fillRect/>
-          </a:stretch>
-        </p:blipFill>
-        <p:spPr>
-          <a:xfrm>
-            <a:off x="4273550" y="1691005"/>
-            <a:ext cx="3644900" cy="3619500"/>
-          </a:xfrm>
-          <a:prstGeom prst="rect">
-            <a:avLst/>
-          </a:prstGeom>
-        </p:spPr>
-      </p:pic>
+        </p:nvSpPr>
+        <p:spPr/>
+        <p:txBody>
+          <a:bodyPr/>
+          <a:p>
+            <a:r>
+              <a:rPr lang="en-US" sz="3600"/>
+              <a:t>Version control system is a </a:t>
+            </a:r>
+            <a:r>
+              <a:rPr lang="en-US" sz="3600">
+                <a:solidFill>
+                  <a:srgbClr val="FF0000"/>
+                </a:solidFill>
+              </a:rPr>
+              <a:t>system that records changes to a file or set of files over time so</a:t>
+            </a:r>
+            <a:r>
+              <a:rPr lang="en-US" sz="3600"/>
+              <a:t> that you can recall specific versions later</a:t>
+            </a:r>
+            <a:endParaRPr lang="en-US" sz="3600"/>
+          </a:p>
+          <a:p>
+            <a:r>
+              <a:rPr lang="en-US" sz="3600">
+                <a:solidFill>
+                  <a:srgbClr val="FF0000"/>
+                </a:solidFill>
+              </a:rPr>
+              <a:t>Distributed means</a:t>
+            </a:r>
+            <a:r>
+              <a:rPr lang="en-US" sz="3600"/>
+              <a:t> that there is </a:t>
+            </a:r>
+            <a:r>
+              <a:rPr lang="en-US" sz="3600">
+                <a:solidFill>
+                  <a:srgbClr val="FF0000"/>
+                </a:solidFill>
+              </a:rPr>
+              <a:t>no main server</a:t>
+            </a:r>
+            <a:r>
+              <a:rPr lang="en-US" sz="3600"/>
+              <a:t> and all of the full history of the project is available once you cloned the project</a:t>
+            </a:r>
+            <a:endParaRPr lang="en-US" sz="3600"/>
+          </a:p>
+        </p:txBody>
+      </p:sp>
     </p:spTree>
   </p:cSld>
   <p:clrMapOvr>

</xml_diff>